<commit_message>
Pushing changes to hypotheses, readme update, and presentation update.
</commit_message>
<xml_diff>
--- a/Northwind Presentation.pptx
+++ b/Northwind Presentation.pptx
@@ -266,6 +266,2644 @@
     </a:lvl9pPr>
   </p:defaultTextStyle>
 </p:presentation>
+</file>
+
+<file path=ppt/diagrams/colors1.xml><?xml version="1.0" encoding="utf-8"?>
+<dgm:colorsDef xmlns:dgm="http://schemas.openxmlformats.org/drawingml/2006/diagram" xmlns:a="http://schemas.openxmlformats.org/drawingml/2006/main" uniqueId="urn:microsoft.com/office/officeart/2005/8/colors/accent1_2">
+  <dgm:title val=""/>
+  <dgm:desc val=""/>
+  <dgm:catLst>
+    <dgm:cat type="accent1" pri="11200"/>
+  </dgm:catLst>
+  <dgm:styleLbl name="node0">
+    <dgm:fillClrLst meth="repeat">
+      <a:schemeClr val="accent1"/>
+    </dgm:fillClrLst>
+    <dgm:linClrLst meth="repeat">
+      <a:schemeClr val="lt1"/>
+    </dgm:linClrLst>
+    <dgm:effectClrLst/>
+    <dgm:txLinClrLst/>
+    <dgm:txFillClrLst/>
+    <dgm:txEffectClrLst/>
+  </dgm:styleLbl>
+  <dgm:styleLbl name="alignNode1">
+    <dgm:fillClrLst meth="repeat">
+      <a:schemeClr val="accent1"/>
+    </dgm:fillClrLst>
+    <dgm:linClrLst meth="repeat">
+      <a:schemeClr val="accent1"/>
+    </dgm:linClrLst>
+    <dgm:effectClrLst/>
+    <dgm:txLinClrLst/>
+    <dgm:txFillClrLst/>
+    <dgm:txEffectClrLst/>
+  </dgm:styleLbl>
+  <dgm:styleLbl name="node1">
+    <dgm:fillClrLst meth="repeat">
+      <a:schemeClr val="accent1"/>
+    </dgm:fillClrLst>
+    <dgm:linClrLst meth="repeat">
+      <a:schemeClr val="lt1"/>
+    </dgm:linClrLst>
+    <dgm:effectClrLst/>
+    <dgm:txLinClrLst/>
+    <dgm:txFillClrLst/>
+    <dgm:txEffectClrLst/>
+  </dgm:styleLbl>
+  <dgm:styleLbl name="lnNode1">
+    <dgm:fillClrLst meth="repeat">
+      <a:schemeClr val="accent1"/>
+    </dgm:fillClrLst>
+    <dgm:linClrLst meth="repeat">
+      <a:schemeClr val="lt1"/>
+    </dgm:linClrLst>
+    <dgm:effectClrLst/>
+    <dgm:txLinClrLst/>
+    <dgm:txFillClrLst/>
+    <dgm:txEffectClrLst/>
+  </dgm:styleLbl>
+  <dgm:styleLbl name="vennNode1">
+    <dgm:fillClrLst meth="repeat">
+      <a:schemeClr val="accent1">
+        <a:alpha val="50000"/>
+      </a:schemeClr>
+    </dgm:fillClrLst>
+    <dgm:linClrLst meth="repeat">
+      <a:schemeClr val="lt1"/>
+    </dgm:linClrLst>
+    <dgm:effectClrLst/>
+    <dgm:txLinClrLst/>
+    <dgm:txFillClrLst/>
+    <dgm:txEffectClrLst/>
+  </dgm:styleLbl>
+  <dgm:styleLbl name="node2">
+    <dgm:fillClrLst meth="repeat">
+      <a:schemeClr val="accent1"/>
+    </dgm:fillClrLst>
+    <dgm:linClrLst meth="repeat">
+      <a:schemeClr val="lt1"/>
+    </dgm:linClrLst>
+    <dgm:effectClrLst/>
+    <dgm:txLinClrLst/>
+    <dgm:txFillClrLst/>
+    <dgm:txEffectClrLst/>
+  </dgm:styleLbl>
+  <dgm:styleLbl name="node3">
+    <dgm:fillClrLst meth="repeat">
+      <a:schemeClr val="accent1"/>
+    </dgm:fillClrLst>
+    <dgm:linClrLst meth="repeat">
+      <a:schemeClr val="lt1"/>
+    </dgm:linClrLst>
+    <dgm:effectClrLst/>
+    <dgm:txLinClrLst/>
+    <dgm:txFillClrLst/>
+    <dgm:txEffectClrLst/>
+  </dgm:styleLbl>
+  <dgm:styleLbl name="node4">
+    <dgm:fillClrLst meth="repeat">
+      <a:schemeClr val="accent1"/>
+    </dgm:fillClrLst>
+    <dgm:linClrLst meth="repeat">
+      <a:schemeClr val="lt1"/>
+    </dgm:linClrLst>
+    <dgm:effectClrLst/>
+    <dgm:txLinClrLst/>
+    <dgm:txFillClrLst/>
+    <dgm:txEffectClrLst/>
+  </dgm:styleLbl>
+  <dgm:styleLbl name="fgImgPlace1">
+    <dgm:fillClrLst meth="repeat">
+      <a:schemeClr val="accent1">
+        <a:tint val="50000"/>
+      </a:schemeClr>
+    </dgm:fillClrLst>
+    <dgm:linClrLst meth="repeat">
+      <a:schemeClr val="lt1"/>
+    </dgm:linClrLst>
+    <dgm:effectClrLst/>
+    <dgm:txLinClrLst/>
+    <dgm:txFillClrLst meth="repeat">
+      <a:schemeClr val="lt1"/>
+    </dgm:txFillClrLst>
+    <dgm:txEffectClrLst/>
+  </dgm:styleLbl>
+  <dgm:styleLbl name="alignImgPlace1">
+    <dgm:fillClrLst meth="repeat">
+      <a:schemeClr val="accent1">
+        <a:tint val="50000"/>
+      </a:schemeClr>
+    </dgm:fillClrLst>
+    <dgm:linClrLst meth="repeat">
+      <a:schemeClr val="lt1"/>
+    </dgm:linClrLst>
+    <dgm:effectClrLst/>
+    <dgm:txLinClrLst/>
+    <dgm:txFillClrLst meth="repeat">
+      <a:schemeClr val="lt1"/>
+    </dgm:txFillClrLst>
+    <dgm:txEffectClrLst/>
+  </dgm:styleLbl>
+  <dgm:styleLbl name="bgImgPlace1">
+    <dgm:fillClrLst meth="repeat">
+      <a:schemeClr val="accent1">
+        <a:tint val="50000"/>
+      </a:schemeClr>
+    </dgm:fillClrLst>
+    <dgm:linClrLst meth="repeat">
+      <a:schemeClr val="lt1"/>
+    </dgm:linClrLst>
+    <dgm:effectClrLst/>
+    <dgm:txLinClrLst/>
+    <dgm:txFillClrLst meth="repeat">
+      <a:schemeClr val="lt1"/>
+    </dgm:txFillClrLst>
+    <dgm:txEffectClrLst/>
+  </dgm:styleLbl>
+  <dgm:styleLbl name="sibTrans2D1">
+    <dgm:fillClrLst meth="repeat">
+      <a:schemeClr val="accent1">
+        <a:tint val="60000"/>
+      </a:schemeClr>
+    </dgm:fillClrLst>
+    <dgm:linClrLst meth="repeat">
+      <a:schemeClr val="accent1">
+        <a:tint val="60000"/>
+      </a:schemeClr>
+    </dgm:linClrLst>
+    <dgm:effectClrLst/>
+    <dgm:txLinClrLst/>
+    <dgm:txFillClrLst/>
+    <dgm:txEffectClrLst/>
+  </dgm:styleLbl>
+  <dgm:styleLbl name="fgSibTrans2D1">
+    <dgm:fillClrLst meth="repeat">
+      <a:schemeClr val="accent1">
+        <a:tint val="60000"/>
+      </a:schemeClr>
+    </dgm:fillClrLst>
+    <dgm:linClrLst meth="repeat">
+      <a:schemeClr val="accent1">
+        <a:tint val="60000"/>
+      </a:schemeClr>
+    </dgm:linClrLst>
+    <dgm:effectClrLst/>
+    <dgm:txLinClrLst/>
+    <dgm:txFillClrLst/>
+    <dgm:txEffectClrLst/>
+  </dgm:styleLbl>
+  <dgm:styleLbl name="bgSibTrans2D1">
+    <dgm:fillClrLst meth="repeat">
+      <a:schemeClr val="accent1">
+        <a:tint val="60000"/>
+      </a:schemeClr>
+    </dgm:fillClrLst>
+    <dgm:linClrLst meth="repeat">
+      <a:schemeClr val="accent1">
+        <a:tint val="60000"/>
+      </a:schemeClr>
+    </dgm:linClrLst>
+    <dgm:effectClrLst/>
+    <dgm:txLinClrLst/>
+    <dgm:txFillClrLst/>
+    <dgm:txEffectClrLst/>
+  </dgm:styleLbl>
+  <dgm:styleLbl name="sibTrans1D1">
+    <dgm:fillClrLst meth="repeat">
+      <a:schemeClr val="accent1"/>
+    </dgm:fillClrLst>
+    <dgm:linClrLst meth="repeat">
+      <a:schemeClr val="accent1"/>
+    </dgm:linClrLst>
+    <dgm:effectClrLst/>
+    <dgm:txLinClrLst/>
+    <dgm:txFillClrLst meth="repeat">
+      <a:schemeClr val="tx1"/>
+    </dgm:txFillClrLst>
+    <dgm:txEffectClrLst/>
+  </dgm:styleLbl>
+  <dgm:styleLbl name="callout">
+    <dgm:fillClrLst meth="repeat">
+      <a:schemeClr val="accent1"/>
+    </dgm:fillClrLst>
+    <dgm:linClrLst meth="repeat">
+      <a:schemeClr val="accent1">
+        <a:tint val="50000"/>
+      </a:schemeClr>
+    </dgm:linClrLst>
+    <dgm:effectClrLst/>
+    <dgm:txLinClrLst/>
+    <dgm:txFillClrLst meth="repeat">
+      <a:schemeClr val="tx1"/>
+    </dgm:txFillClrLst>
+    <dgm:txEffectClrLst/>
+  </dgm:styleLbl>
+  <dgm:styleLbl name="asst0">
+    <dgm:fillClrLst meth="repeat">
+      <a:schemeClr val="accent1"/>
+    </dgm:fillClrLst>
+    <dgm:linClrLst meth="repeat">
+      <a:schemeClr val="lt1"/>
+    </dgm:linClrLst>
+    <dgm:effectClrLst/>
+    <dgm:txLinClrLst/>
+    <dgm:txFillClrLst/>
+    <dgm:txEffectClrLst/>
+  </dgm:styleLbl>
+  <dgm:styleLbl name="asst1">
+    <dgm:fillClrLst meth="repeat">
+      <a:schemeClr val="accent1"/>
+    </dgm:fillClrLst>
+    <dgm:linClrLst meth="repeat">
+      <a:schemeClr val="lt1"/>
+    </dgm:linClrLst>
+    <dgm:effectClrLst/>
+    <dgm:txLinClrLst/>
+    <dgm:txFillClrLst/>
+    <dgm:txEffectClrLst/>
+  </dgm:styleLbl>
+  <dgm:styleLbl name="asst2">
+    <dgm:fillClrLst meth="repeat">
+      <a:schemeClr val="accent1"/>
+    </dgm:fillClrLst>
+    <dgm:linClrLst meth="repeat">
+      <a:schemeClr val="lt1"/>
+    </dgm:linClrLst>
+    <dgm:effectClrLst/>
+    <dgm:txLinClrLst/>
+    <dgm:txFillClrLst/>
+    <dgm:txEffectClrLst/>
+  </dgm:styleLbl>
+  <dgm:styleLbl name="asst3">
+    <dgm:fillClrLst meth="repeat">
+      <a:schemeClr val="accent1"/>
+    </dgm:fillClrLst>
+    <dgm:linClrLst meth="repeat">
+      <a:schemeClr val="lt1"/>
+    </dgm:linClrLst>
+    <dgm:effectClrLst/>
+    <dgm:txLinClrLst/>
+    <dgm:txFillClrLst/>
+    <dgm:txEffectClrLst/>
+  </dgm:styleLbl>
+  <dgm:styleLbl name="asst4">
+    <dgm:fillClrLst meth="repeat">
+      <a:schemeClr val="accent1"/>
+    </dgm:fillClrLst>
+    <dgm:linClrLst meth="repeat">
+      <a:schemeClr val="lt1"/>
+    </dgm:linClrLst>
+    <dgm:effectClrLst/>
+    <dgm:txLinClrLst/>
+    <dgm:txFillClrLst/>
+    <dgm:txEffectClrLst/>
+  </dgm:styleLbl>
+  <dgm:styleLbl name="parChTrans2D1">
+    <dgm:fillClrLst meth="repeat">
+      <a:schemeClr val="accent1">
+        <a:tint val="60000"/>
+      </a:schemeClr>
+    </dgm:fillClrLst>
+    <dgm:linClrLst meth="repeat">
+      <a:schemeClr val="accent1">
+        <a:tint val="60000"/>
+      </a:schemeClr>
+    </dgm:linClrLst>
+    <dgm:effectClrLst/>
+    <dgm:txLinClrLst/>
+    <dgm:txFillClrLst meth="repeat">
+      <a:schemeClr val="lt1"/>
+    </dgm:txFillClrLst>
+    <dgm:txEffectClrLst/>
+  </dgm:styleLbl>
+  <dgm:styleLbl name="parChTrans2D2">
+    <dgm:fillClrLst meth="repeat">
+      <a:schemeClr val="accent1"/>
+    </dgm:fillClrLst>
+    <dgm:linClrLst meth="repeat">
+      <a:schemeClr val="accent1"/>
+    </dgm:linClrLst>
+    <dgm:effectClrLst/>
+    <dgm:txLinClrLst/>
+    <dgm:txFillClrLst meth="repeat">
+      <a:schemeClr val="lt1"/>
+    </dgm:txFillClrLst>
+    <dgm:txEffectClrLst/>
+  </dgm:styleLbl>
+  <dgm:styleLbl name="parChTrans2D3">
+    <dgm:fillClrLst meth="repeat">
+      <a:schemeClr val="accent1"/>
+    </dgm:fillClrLst>
+    <dgm:linClrLst meth="repeat">
+      <a:schemeClr val="accent1"/>
+    </dgm:linClrLst>
+    <dgm:effectClrLst/>
+    <dgm:txLinClrLst/>
+    <dgm:txFillClrLst meth="repeat">
+      <a:schemeClr val="lt1"/>
+    </dgm:txFillClrLst>
+    <dgm:txEffectClrLst/>
+  </dgm:styleLbl>
+  <dgm:styleLbl name="parChTrans2D4">
+    <dgm:fillClrLst meth="repeat">
+      <a:schemeClr val="accent1"/>
+    </dgm:fillClrLst>
+    <dgm:linClrLst meth="repeat">
+      <a:schemeClr val="accent1"/>
+    </dgm:linClrLst>
+    <dgm:effectClrLst/>
+    <dgm:txLinClrLst/>
+    <dgm:txFillClrLst meth="repeat">
+      <a:schemeClr val="lt1"/>
+    </dgm:txFillClrLst>
+    <dgm:txEffectClrLst/>
+  </dgm:styleLbl>
+  <dgm:styleLbl name="parChTrans1D1">
+    <dgm:fillClrLst meth="repeat">
+      <a:schemeClr val="accent1"/>
+    </dgm:fillClrLst>
+    <dgm:linClrLst meth="repeat">
+      <a:schemeClr val="accent1">
+        <a:shade val="60000"/>
+      </a:schemeClr>
+    </dgm:linClrLst>
+    <dgm:effectClrLst/>
+    <dgm:txLinClrLst/>
+    <dgm:txFillClrLst meth="repeat">
+      <a:schemeClr val="tx1"/>
+    </dgm:txFillClrLst>
+    <dgm:txEffectClrLst/>
+  </dgm:styleLbl>
+  <dgm:styleLbl name="parChTrans1D2">
+    <dgm:fillClrLst meth="repeat">
+      <a:schemeClr val="accent1"/>
+    </dgm:fillClrLst>
+    <dgm:linClrLst meth="repeat">
+      <a:schemeClr val="accent1">
+        <a:shade val="60000"/>
+      </a:schemeClr>
+    </dgm:linClrLst>
+    <dgm:effectClrLst/>
+    <dgm:txLinClrLst/>
+    <dgm:txFillClrLst meth="repeat">
+      <a:schemeClr val="tx1"/>
+    </dgm:txFillClrLst>
+    <dgm:txEffectClrLst/>
+  </dgm:styleLbl>
+  <dgm:styleLbl name="parChTrans1D3">
+    <dgm:fillClrLst meth="repeat">
+      <a:schemeClr val="accent1"/>
+    </dgm:fillClrLst>
+    <dgm:linClrLst meth="repeat">
+      <a:schemeClr val="accent1">
+        <a:shade val="80000"/>
+      </a:schemeClr>
+    </dgm:linClrLst>
+    <dgm:effectClrLst/>
+    <dgm:txLinClrLst/>
+    <dgm:txFillClrLst meth="repeat">
+      <a:schemeClr val="tx1"/>
+    </dgm:txFillClrLst>
+    <dgm:txEffectClrLst/>
+  </dgm:styleLbl>
+  <dgm:styleLbl name="parChTrans1D4">
+    <dgm:fillClrLst meth="repeat">
+      <a:schemeClr val="accent1"/>
+    </dgm:fillClrLst>
+    <dgm:linClrLst meth="repeat">
+      <a:schemeClr val="accent1">
+        <a:shade val="80000"/>
+      </a:schemeClr>
+    </dgm:linClrLst>
+    <dgm:effectClrLst/>
+    <dgm:txLinClrLst/>
+    <dgm:txFillClrLst meth="repeat">
+      <a:schemeClr val="tx1"/>
+    </dgm:txFillClrLst>
+    <dgm:txEffectClrLst/>
+  </dgm:styleLbl>
+  <dgm:styleLbl name="fgAcc1">
+    <dgm:fillClrLst meth="repeat">
+      <a:schemeClr val="lt1">
+        <a:alpha val="90000"/>
+      </a:schemeClr>
+    </dgm:fillClrLst>
+    <dgm:linClrLst meth="repeat">
+      <a:schemeClr val="accent1"/>
+    </dgm:linClrLst>
+    <dgm:effectClrLst/>
+    <dgm:txLinClrLst/>
+    <dgm:txFillClrLst meth="repeat">
+      <a:schemeClr val="dk1"/>
+    </dgm:txFillClrLst>
+    <dgm:txEffectClrLst/>
+  </dgm:styleLbl>
+  <dgm:styleLbl name="conFgAcc1">
+    <dgm:fillClrLst meth="repeat">
+      <a:schemeClr val="lt1">
+        <a:alpha val="90000"/>
+      </a:schemeClr>
+    </dgm:fillClrLst>
+    <dgm:linClrLst meth="repeat">
+      <a:schemeClr val="accent1"/>
+    </dgm:linClrLst>
+    <dgm:effectClrLst/>
+    <dgm:txLinClrLst/>
+    <dgm:txFillClrLst meth="repeat">
+      <a:schemeClr val="dk1"/>
+    </dgm:txFillClrLst>
+    <dgm:txEffectClrLst/>
+  </dgm:styleLbl>
+  <dgm:styleLbl name="alignAcc1">
+    <dgm:fillClrLst meth="repeat">
+      <a:schemeClr val="lt1">
+        <a:alpha val="90000"/>
+      </a:schemeClr>
+    </dgm:fillClrLst>
+    <dgm:linClrLst meth="repeat">
+      <a:schemeClr val="accent1"/>
+    </dgm:linClrLst>
+    <dgm:effectClrLst/>
+    <dgm:txLinClrLst/>
+    <dgm:txFillClrLst meth="repeat">
+      <a:schemeClr val="dk1"/>
+    </dgm:txFillClrLst>
+    <dgm:txEffectClrLst/>
+  </dgm:styleLbl>
+  <dgm:styleLbl name="trAlignAcc1">
+    <dgm:fillClrLst meth="repeat">
+      <a:schemeClr val="lt1">
+        <a:alpha val="40000"/>
+      </a:schemeClr>
+    </dgm:fillClrLst>
+    <dgm:linClrLst meth="repeat">
+      <a:schemeClr val="accent1"/>
+    </dgm:linClrLst>
+    <dgm:effectClrLst/>
+    <dgm:txLinClrLst/>
+    <dgm:txFillClrLst meth="repeat">
+      <a:schemeClr val="dk1"/>
+    </dgm:txFillClrLst>
+    <dgm:txEffectClrLst/>
+  </dgm:styleLbl>
+  <dgm:styleLbl name="bgAcc1">
+    <dgm:fillClrLst meth="repeat">
+      <a:schemeClr val="lt1">
+        <a:alpha val="90000"/>
+      </a:schemeClr>
+    </dgm:fillClrLst>
+    <dgm:linClrLst meth="repeat">
+      <a:schemeClr val="accent1"/>
+    </dgm:linClrLst>
+    <dgm:effectClrLst/>
+    <dgm:txLinClrLst/>
+    <dgm:txFillClrLst meth="repeat">
+      <a:schemeClr val="dk1"/>
+    </dgm:txFillClrLst>
+    <dgm:txEffectClrLst/>
+  </dgm:styleLbl>
+  <dgm:styleLbl name="solidFgAcc1">
+    <dgm:fillClrLst meth="repeat">
+      <a:schemeClr val="lt1"/>
+    </dgm:fillClrLst>
+    <dgm:linClrLst meth="repeat">
+      <a:schemeClr val="accent1"/>
+    </dgm:linClrLst>
+    <dgm:effectClrLst/>
+    <dgm:txLinClrLst/>
+    <dgm:txFillClrLst meth="repeat">
+      <a:schemeClr val="dk1"/>
+    </dgm:txFillClrLst>
+    <dgm:txEffectClrLst/>
+  </dgm:styleLbl>
+  <dgm:styleLbl name="solidAlignAcc1">
+    <dgm:fillClrLst meth="repeat">
+      <a:schemeClr val="lt1"/>
+    </dgm:fillClrLst>
+    <dgm:linClrLst meth="repeat">
+      <a:schemeClr val="accent1"/>
+    </dgm:linClrLst>
+    <dgm:effectClrLst/>
+    <dgm:txLinClrLst/>
+    <dgm:txFillClrLst meth="repeat">
+      <a:schemeClr val="dk1"/>
+    </dgm:txFillClrLst>
+    <dgm:txEffectClrLst/>
+  </dgm:styleLbl>
+  <dgm:styleLbl name="solidBgAcc1">
+    <dgm:fillClrLst meth="repeat">
+      <a:schemeClr val="lt1"/>
+    </dgm:fillClrLst>
+    <dgm:linClrLst meth="repeat">
+      <a:schemeClr val="accent1"/>
+    </dgm:linClrLst>
+    <dgm:effectClrLst/>
+    <dgm:txLinClrLst/>
+    <dgm:txFillClrLst meth="repeat">
+      <a:schemeClr val="dk1"/>
+    </dgm:txFillClrLst>
+    <dgm:txEffectClrLst/>
+  </dgm:styleLbl>
+  <dgm:styleLbl name="fgAccFollowNode1">
+    <dgm:fillClrLst meth="repeat">
+      <a:schemeClr val="accent1">
+        <a:alpha val="90000"/>
+        <a:tint val="40000"/>
+      </a:schemeClr>
+    </dgm:fillClrLst>
+    <dgm:linClrLst meth="repeat">
+      <a:schemeClr val="accent1">
+        <a:alpha val="90000"/>
+        <a:tint val="40000"/>
+      </a:schemeClr>
+    </dgm:linClrLst>
+    <dgm:effectClrLst/>
+    <dgm:txLinClrLst/>
+    <dgm:txFillClrLst meth="repeat">
+      <a:schemeClr val="dk1"/>
+    </dgm:txFillClrLst>
+    <dgm:txEffectClrLst/>
+  </dgm:styleLbl>
+  <dgm:styleLbl name="alignAccFollowNode1">
+    <dgm:fillClrLst meth="repeat">
+      <a:schemeClr val="accent1">
+        <a:alpha val="90000"/>
+        <a:tint val="40000"/>
+      </a:schemeClr>
+    </dgm:fillClrLst>
+    <dgm:linClrLst meth="repeat">
+      <a:schemeClr val="accent1">
+        <a:alpha val="90000"/>
+        <a:tint val="40000"/>
+      </a:schemeClr>
+    </dgm:linClrLst>
+    <dgm:effectClrLst/>
+    <dgm:txLinClrLst/>
+    <dgm:txFillClrLst meth="repeat">
+      <a:schemeClr val="dk1"/>
+    </dgm:txFillClrLst>
+    <dgm:txEffectClrLst/>
+  </dgm:styleLbl>
+  <dgm:styleLbl name="bgAccFollowNode1">
+    <dgm:fillClrLst meth="repeat">
+      <a:schemeClr val="accent1">
+        <a:alpha val="90000"/>
+        <a:tint val="40000"/>
+      </a:schemeClr>
+    </dgm:fillClrLst>
+    <dgm:linClrLst meth="repeat">
+      <a:schemeClr val="accent1">
+        <a:alpha val="90000"/>
+        <a:tint val="40000"/>
+      </a:schemeClr>
+    </dgm:linClrLst>
+    <dgm:effectClrLst/>
+    <dgm:txLinClrLst/>
+    <dgm:txFillClrLst meth="repeat">
+      <a:schemeClr val="dk1"/>
+    </dgm:txFillClrLst>
+    <dgm:txEffectClrLst/>
+  </dgm:styleLbl>
+  <dgm:styleLbl name="fgAcc0">
+    <dgm:fillClrLst meth="repeat">
+      <a:schemeClr val="lt1">
+        <a:alpha val="90000"/>
+      </a:schemeClr>
+    </dgm:fillClrLst>
+    <dgm:linClrLst meth="repeat">
+      <a:schemeClr val="accent1"/>
+    </dgm:linClrLst>
+    <dgm:effectClrLst/>
+    <dgm:txLinClrLst/>
+    <dgm:txFillClrLst meth="repeat">
+      <a:schemeClr val="dk1"/>
+    </dgm:txFillClrLst>
+    <dgm:txEffectClrLst/>
+  </dgm:styleLbl>
+  <dgm:styleLbl name="fgAcc2">
+    <dgm:fillClrLst meth="repeat">
+      <a:schemeClr val="lt1">
+        <a:alpha val="90000"/>
+      </a:schemeClr>
+    </dgm:fillClrLst>
+    <dgm:linClrLst meth="repeat">
+      <a:schemeClr val="accent1"/>
+    </dgm:linClrLst>
+    <dgm:effectClrLst/>
+    <dgm:txLinClrLst/>
+    <dgm:txFillClrLst meth="repeat">
+      <a:schemeClr val="dk1"/>
+    </dgm:txFillClrLst>
+    <dgm:txEffectClrLst/>
+  </dgm:styleLbl>
+  <dgm:styleLbl name="fgAcc3">
+    <dgm:fillClrLst meth="repeat">
+      <a:schemeClr val="lt1">
+        <a:alpha val="90000"/>
+      </a:schemeClr>
+    </dgm:fillClrLst>
+    <dgm:linClrLst meth="repeat">
+      <a:schemeClr val="accent1"/>
+    </dgm:linClrLst>
+    <dgm:effectClrLst/>
+    <dgm:txLinClrLst/>
+    <dgm:txFillClrLst meth="repeat">
+      <a:schemeClr val="dk1"/>
+    </dgm:txFillClrLst>
+    <dgm:txEffectClrLst/>
+  </dgm:styleLbl>
+  <dgm:styleLbl name="fgAcc4">
+    <dgm:fillClrLst meth="repeat">
+      <a:schemeClr val="lt1">
+        <a:alpha val="90000"/>
+      </a:schemeClr>
+    </dgm:fillClrLst>
+    <dgm:linClrLst meth="repeat">
+      <a:schemeClr val="accent1"/>
+    </dgm:linClrLst>
+    <dgm:effectClrLst/>
+    <dgm:txLinClrLst/>
+    <dgm:txFillClrLst meth="repeat">
+      <a:schemeClr val="dk1"/>
+    </dgm:txFillClrLst>
+    <dgm:txEffectClrLst/>
+  </dgm:styleLbl>
+  <dgm:styleLbl name="bgShp">
+    <dgm:fillClrLst meth="repeat">
+      <a:schemeClr val="accent1">
+        <a:tint val="40000"/>
+      </a:schemeClr>
+    </dgm:fillClrLst>
+    <dgm:linClrLst meth="repeat">
+      <a:schemeClr val="accent1"/>
+    </dgm:linClrLst>
+    <dgm:effectClrLst/>
+    <dgm:txLinClrLst/>
+    <dgm:txFillClrLst meth="repeat">
+      <a:schemeClr val="dk1"/>
+    </dgm:txFillClrLst>
+    <dgm:txEffectClrLst/>
+  </dgm:styleLbl>
+  <dgm:styleLbl name="dkBgShp">
+    <dgm:fillClrLst meth="repeat">
+      <a:schemeClr val="accent1">
+        <a:shade val="80000"/>
+      </a:schemeClr>
+    </dgm:fillClrLst>
+    <dgm:linClrLst meth="repeat">
+      <a:schemeClr val="accent1"/>
+    </dgm:linClrLst>
+    <dgm:effectClrLst/>
+    <dgm:txLinClrLst/>
+    <dgm:txFillClrLst meth="repeat">
+      <a:schemeClr val="lt1"/>
+    </dgm:txFillClrLst>
+    <dgm:txEffectClrLst/>
+  </dgm:styleLbl>
+  <dgm:styleLbl name="trBgShp">
+    <dgm:fillClrLst meth="repeat">
+      <a:schemeClr val="accent1">
+        <a:tint val="50000"/>
+        <a:alpha val="40000"/>
+      </a:schemeClr>
+    </dgm:fillClrLst>
+    <dgm:linClrLst meth="repeat">
+      <a:schemeClr val="accent1"/>
+    </dgm:linClrLst>
+    <dgm:effectClrLst/>
+    <dgm:txLinClrLst/>
+    <dgm:txFillClrLst meth="repeat">
+      <a:schemeClr val="lt1"/>
+    </dgm:txFillClrLst>
+    <dgm:txEffectClrLst/>
+  </dgm:styleLbl>
+  <dgm:styleLbl name="fgShp">
+    <dgm:fillClrLst meth="repeat">
+      <a:schemeClr val="accent1">
+        <a:tint val="60000"/>
+      </a:schemeClr>
+    </dgm:fillClrLst>
+    <dgm:linClrLst meth="repeat">
+      <a:schemeClr val="lt1"/>
+    </dgm:linClrLst>
+    <dgm:effectClrLst/>
+    <dgm:txLinClrLst/>
+    <dgm:txFillClrLst meth="repeat">
+      <a:schemeClr val="dk1"/>
+    </dgm:txFillClrLst>
+    <dgm:txEffectClrLst/>
+  </dgm:styleLbl>
+  <dgm:styleLbl name="revTx">
+    <dgm:fillClrLst meth="repeat">
+      <a:schemeClr val="lt1">
+        <a:alpha val="0"/>
+      </a:schemeClr>
+    </dgm:fillClrLst>
+    <dgm:linClrLst meth="repeat">
+      <a:schemeClr val="dk1">
+        <a:alpha val="0"/>
+      </a:schemeClr>
+    </dgm:linClrLst>
+    <dgm:effectClrLst/>
+    <dgm:txLinClrLst/>
+    <dgm:txFillClrLst meth="repeat">
+      <a:schemeClr val="tx1"/>
+    </dgm:txFillClrLst>
+    <dgm:txEffectClrLst/>
+  </dgm:styleLbl>
+</dgm:colorsDef>
+</file>
+
+<file path=ppt/diagrams/data1.xml><?xml version="1.0" encoding="utf-8"?>
+<dgm:dataModel xmlns:dgm="http://schemas.openxmlformats.org/drawingml/2006/diagram" xmlns:a="http://schemas.openxmlformats.org/drawingml/2006/main">
+  <dgm:ptLst>
+    <dgm:pt modelId="{0AF453FB-BFF9-4355-ADE3-C15BFE6FF0BB}" type="doc">
+      <dgm:prSet loTypeId="urn:microsoft.com/office/officeart/2005/8/layout/process4" loCatId="list" qsTypeId="urn:microsoft.com/office/officeart/2005/8/quickstyle/simple1" qsCatId="simple" csTypeId="urn:microsoft.com/office/officeart/2005/8/colors/accent1_2" csCatId="accent1" phldr="1"/>
+      <dgm:spPr/>
+      <dgm:t>
+        <a:bodyPr/>
+        <a:lstStyle/>
+        <a:p>
+          <a:endParaRPr lang="en-US"/>
+        </a:p>
+      </dgm:t>
+    </dgm:pt>
+    <dgm:pt modelId="{3478970B-FA43-4934-A712-47DAC7C2E168}">
+      <dgm:prSet phldrT="[Text]"/>
+      <dgm:spPr>
+        <a:gradFill rotWithShape="0">
+          <a:gsLst>
+            <a:gs pos="0">
+              <a:schemeClr val="accent4">
+                <a:lumMod val="75000"/>
+              </a:schemeClr>
+            </a:gs>
+            <a:gs pos="30000">
+              <a:srgbClr val="66008F"/>
+            </a:gs>
+            <a:gs pos="64999">
+              <a:srgbClr val="BA0066"/>
+            </a:gs>
+            <a:gs pos="89999">
+              <a:srgbClr val="FF0000"/>
+            </a:gs>
+            <a:gs pos="100000">
+              <a:srgbClr val="FF8200"/>
+            </a:gs>
+          </a:gsLst>
+          <a:lin ang="16200000" scaled="0"/>
+        </a:gradFill>
+      </dgm:spPr>
+      <dgm:t>
+        <a:bodyPr/>
+        <a:lstStyle/>
+        <a:p>
+          <a:r>
+            <a:rPr lang="en-US" dirty="0" smtClean="0"/>
+            <a:t>Ask Questions</a:t>
+          </a:r>
+          <a:endParaRPr lang="en-US" dirty="0"/>
+        </a:p>
+      </dgm:t>
+    </dgm:pt>
+    <dgm:pt modelId="{BB46A3DB-A22E-47CE-9A60-0FEF73FFD5C7}" type="parTrans" cxnId="{D0499684-E999-4885-9A24-BCD850E4FED5}">
+      <dgm:prSet/>
+      <dgm:spPr/>
+      <dgm:t>
+        <a:bodyPr/>
+        <a:lstStyle/>
+        <a:p>
+          <a:endParaRPr lang="en-US"/>
+        </a:p>
+      </dgm:t>
+    </dgm:pt>
+    <dgm:pt modelId="{620FDFFB-0C6C-46ED-A425-1CDE45B16C69}" type="sibTrans" cxnId="{D0499684-E999-4885-9A24-BCD850E4FED5}">
+      <dgm:prSet/>
+      <dgm:spPr/>
+      <dgm:t>
+        <a:bodyPr/>
+        <a:lstStyle/>
+        <a:p>
+          <a:endParaRPr lang="en-US"/>
+        </a:p>
+      </dgm:t>
+    </dgm:pt>
+    <dgm:pt modelId="{B06AF023-242A-4F5C-AA88-07BE2E2B353E}">
+      <dgm:prSet phldrT="[Text]"/>
+      <dgm:spPr>
+        <a:gradFill rotWithShape="0">
+          <a:gsLst>
+            <a:gs pos="0">
+              <a:schemeClr val="accent4">
+                <a:lumMod val="75000"/>
+              </a:schemeClr>
+            </a:gs>
+            <a:gs pos="30000">
+              <a:srgbClr val="66008F"/>
+            </a:gs>
+            <a:gs pos="64999">
+              <a:srgbClr val="BA0066"/>
+            </a:gs>
+            <a:gs pos="89999">
+              <a:srgbClr val="FF0000"/>
+            </a:gs>
+            <a:gs pos="100000">
+              <a:srgbClr val="FF8200"/>
+            </a:gs>
+          </a:gsLst>
+          <a:lin ang="16200000" scaled="0"/>
+        </a:gradFill>
+      </dgm:spPr>
+      <dgm:t>
+        <a:bodyPr/>
+        <a:lstStyle/>
+        <a:p>
+          <a:r>
+            <a:rPr lang="en-US" dirty="0" smtClean="0"/>
+            <a:t>Formulate Hypothesis</a:t>
+          </a:r>
+          <a:endParaRPr lang="en-US" dirty="0"/>
+        </a:p>
+      </dgm:t>
+    </dgm:pt>
+    <dgm:pt modelId="{0B365306-A1CA-48F3-90CA-2CB4D97FB59F}" type="parTrans" cxnId="{91C7B2D0-EB04-47C3-980B-0E7AB7BA713E}">
+      <dgm:prSet/>
+      <dgm:spPr/>
+      <dgm:t>
+        <a:bodyPr/>
+        <a:lstStyle/>
+        <a:p>
+          <a:endParaRPr lang="en-US"/>
+        </a:p>
+      </dgm:t>
+    </dgm:pt>
+    <dgm:pt modelId="{2D45C139-E598-4DF1-B41F-C96F3F789955}" type="sibTrans" cxnId="{91C7B2D0-EB04-47C3-980B-0E7AB7BA713E}">
+      <dgm:prSet/>
+      <dgm:spPr/>
+      <dgm:t>
+        <a:bodyPr/>
+        <a:lstStyle/>
+        <a:p>
+          <a:endParaRPr lang="en-US"/>
+        </a:p>
+      </dgm:t>
+    </dgm:pt>
+    <dgm:pt modelId="{316ECE26-8F09-44A1-B5A5-7AE0F5E22ADB}">
+      <dgm:prSet phldrT="[Text]"/>
+      <dgm:spPr>
+        <a:gradFill rotWithShape="0">
+          <a:gsLst>
+            <a:gs pos="0">
+              <a:schemeClr val="accent4">
+                <a:lumMod val="75000"/>
+              </a:schemeClr>
+            </a:gs>
+            <a:gs pos="30000">
+              <a:srgbClr val="66008F"/>
+            </a:gs>
+            <a:gs pos="64999">
+              <a:srgbClr val="BA0066"/>
+            </a:gs>
+            <a:gs pos="89999">
+              <a:srgbClr val="FF0000"/>
+            </a:gs>
+            <a:gs pos="100000">
+              <a:srgbClr val="FF8200"/>
+            </a:gs>
+          </a:gsLst>
+          <a:lin ang="16200000" scaled="0"/>
+        </a:gradFill>
+      </dgm:spPr>
+      <dgm:t>
+        <a:bodyPr/>
+        <a:lstStyle/>
+        <a:p>
+          <a:r>
+            <a:rPr lang="en-US" dirty="0" smtClean="0"/>
+            <a:t>Gather Data</a:t>
+          </a:r>
+          <a:endParaRPr lang="en-US" dirty="0"/>
+        </a:p>
+      </dgm:t>
+    </dgm:pt>
+    <dgm:pt modelId="{17F53CA9-01B0-41A6-B718-DD04868A9AF1}" type="parTrans" cxnId="{F25EC069-0563-4842-A141-ACD94D73AE3F}">
+      <dgm:prSet/>
+      <dgm:spPr/>
+      <dgm:t>
+        <a:bodyPr/>
+        <a:lstStyle/>
+        <a:p>
+          <a:endParaRPr lang="en-US"/>
+        </a:p>
+      </dgm:t>
+    </dgm:pt>
+    <dgm:pt modelId="{6CA68B76-63DC-41DA-AA6A-28A638DE28AD}" type="sibTrans" cxnId="{F25EC069-0563-4842-A141-ACD94D73AE3F}">
+      <dgm:prSet/>
+      <dgm:spPr/>
+      <dgm:t>
+        <a:bodyPr/>
+        <a:lstStyle/>
+        <a:p>
+          <a:endParaRPr lang="en-US"/>
+        </a:p>
+      </dgm:t>
+    </dgm:pt>
+    <dgm:pt modelId="{D357ED7B-E47C-460E-B5CE-564B291C7146}">
+      <dgm:prSet phldrT="[Text]"/>
+      <dgm:spPr>
+        <a:gradFill rotWithShape="0">
+          <a:gsLst>
+            <a:gs pos="0">
+              <a:schemeClr val="accent4">
+                <a:lumMod val="75000"/>
+              </a:schemeClr>
+            </a:gs>
+            <a:gs pos="30000">
+              <a:srgbClr val="66008F"/>
+            </a:gs>
+            <a:gs pos="64999">
+              <a:srgbClr val="BA0066"/>
+            </a:gs>
+            <a:gs pos="89999">
+              <a:srgbClr val="FF0000"/>
+            </a:gs>
+            <a:gs pos="100000">
+              <a:srgbClr val="FF8200"/>
+            </a:gs>
+          </a:gsLst>
+          <a:lin ang="16200000" scaled="0"/>
+        </a:gradFill>
+      </dgm:spPr>
+      <dgm:t>
+        <a:bodyPr/>
+        <a:lstStyle/>
+        <a:p>
+          <a:r>
+            <a:rPr lang="en-US" dirty="0" smtClean="0"/>
+            <a:t>Visualize</a:t>
+          </a:r>
+          <a:endParaRPr lang="en-US" dirty="0"/>
+        </a:p>
+      </dgm:t>
+    </dgm:pt>
+    <dgm:pt modelId="{D41A99EE-6068-41C8-8FC8-714FE5A7306A}" type="parTrans" cxnId="{7D8A6C12-1E29-47E0-A143-A30060346C65}">
+      <dgm:prSet/>
+      <dgm:spPr/>
+      <dgm:t>
+        <a:bodyPr/>
+        <a:lstStyle/>
+        <a:p>
+          <a:endParaRPr lang="en-US"/>
+        </a:p>
+      </dgm:t>
+    </dgm:pt>
+    <dgm:pt modelId="{0BC6A01E-6AEF-434C-955E-C2BB2848FC9B}" type="sibTrans" cxnId="{7D8A6C12-1E29-47E0-A143-A30060346C65}">
+      <dgm:prSet/>
+      <dgm:spPr/>
+      <dgm:t>
+        <a:bodyPr/>
+        <a:lstStyle/>
+        <a:p>
+          <a:endParaRPr lang="en-US"/>
+        </a:p>
+      </dgm:t>
+    </dgm:pt>
+    <dgm:pt modelId="{EEFDEA95-407A-4A1F-AFDD-493127FBF30F}">
+      <dgm:prSet phldrT="[Text]"/>
+      <dgm:spPr>
+        <a:gradFill rotWithShape="0">
+          <a:gsLst>
+            <a:gs pos="0">
+              <a:schemeClr val="accent4">
+                <a:lumMod val="75000"/>
+              </a:schemeClr>
+            </a:gs>
+            <a:gs pos="30000">
+              <a:srgbClr val="66008F"/>
+            </a:gs>
+            <a:gs pos="64999">
+              <a:srgbClr val="BA0066"/>
+            </a:gs>
+            <a:gs pos="89999">
+              <a:srgbClr val="FF0000"/>
+            </a:gs>
+            <a:gs pos="100000">
+              <a:srgbClr val="FF8200"/>
+            </a:gs>
+          </a:gsLst>
+          <a:lin ang="16200000" scaled="0"/>
+        </a:gradFill>
+      </dgm:spPr>
+      <dgm:t>
+        <a:bodyPr/>
+        <a:lstStyle/>
+        <a:p>
+          <a:r>
+            <a:rPr lang="en-US" dirty="0" smtClean="0"/>
+            <a:t>Test</a:t>
+          </a:r>
+          <a:endParaRPr lang="en-US" dirty="0"/>
+        </a:p>
+      </dgm:t>
+    </dgm:pt>
+    <dgm:pt modelId="{D6EDE99F-8FFD-49F2-9C76-CCE76F2F93AB}" type="parTrans" cxnId="{D1AB8EE1-F56D-4FAA-89E1-49A634E03A45}">
+      <dgm:prSet/>
+      <dgm:spPr/>
+      <dgm:t>
+        <a:bodyPr/>
+        <a:lstStyle/>
+        <a:p>
+          <a:endParaRPr lang="en-US"/>
+        </a:p>
+      </dgm:t>
+    </dgm:pt>
+    <dgm:pt modelId="{45ACFBF5-AABD-46C3-A451-C306D8232771}" type="sibTrans" cxnId="{D1AB8EE1-F56D-4FAA-89E1-49A634E03A45}">
+      <dgm:prSet/>
+      <dgm:spPr/>
+      <dgm:t>
+        <a:bodyPr/>
+        <a:lstStyle/>
+        <a:p>
+          <a:endParaRPr lang="en-US"/>
+        </a:p>
+      </dgm:t>
+    </dgm:pt>
+    <dgm:pt modelId="{4A16269B-7C7B-4474-97CE-AFC1466EDE10}">
+      <dgm:prSet phldrT="[Text]"/>
+      <dgm:spPr>
+        <a:gradFill rotWithShape="0">
+          <a:gsLst>
+            <a:gs pos="0">
+              <a:schemeClr val="accent4">
+                <a:lumMod val="75000"/>
+              </a:schemeClr>
+            </a:gs>
+            <a:gs pos="30000">
+              <a:srgbClr val="66008F"/>
+            </a:gs>
+            <a:gs pos="64999">
+              <a:srgbClr val="BA0066"/>
+            </a:gs>
+            <a:gs pos="89999">
+              <a:srgbClr val="FF0000"/>
+            </a:gs>
+            <a:gs pos="100000">
+              <a:srgbClr val="FF8200"/>
+            </a:gs>
+          </a:gsLst>
+          <a:lin ang="16200000" scaled="0"/>
+        </a:gradFill>
+      </dgm:spPr>
+      <dgm:t>
+        <a:bodyPr/>
+        <a:lstStyle/>
+        <a:p>
+          <a:r>
+            <a:rPr lang="en-US" dirty="0" smtClean="0"/>
+            <a:t>Conclusion</a:t>
+          </a:r>
+          <a:endParaRPr lang="en-US" dirty="0"/>
+        </a:p>
+      </dgm:t>
+    </dgm:pt>
+    <dgm:pt modelId="{881C9D84-5CDD-4D32-97FE-F6F0EA5BF2F1}" type="parTrans" cxnId="{390682CD-5941-4E82-9C4E-D22D6A5DB03F}">
+      <dgm:prSet/>
+      <dgm:spPr/>
+      <dgm:t>
+        <a:bodyPr/>
+        <a:lstStyle/>
+        <a:p>
+          <a:endParaRPr lang="en-US"/>
+        </a:p>
+      </dgm:t>
+    </dgm:pt>
+    <dgm:pt modelId="{F371E34A-A096-4F1D-8845-4489C27BEFF3}" type="sibTrans" cxnId="{390682CD-5941-4E82-9C4E-D22D6A5DB03F}">
+      <dgm:prSet/>
+      <dgm:spPr/>
+      <dgm:t>
+        <a:bodyPr/>
+        <a:lstStyle/>
+        <a:p>
+          <a:endParaRPr lang="en-US"/>
+        </a:p>
+      </dgm:t>
+    </dgm:pt>
+    <dgm:pt modelId="{5CFC4887-7B9E-49BC-8B17-CB46EAF614B3}" type="pres">
+      <dgm:prSet presAssocID="{0AF453FB-BFF9-4355-ADE3-C15BFE6FF0BB}" presName="Name0" presStyleCnt="0">
+        <dgm:presLayoutVars>
+          <dgm:dir/>
+          <dgm:animLvl val="lvl"/>
+          <dgm:resizeHandles val="exact"/>
+        </dgm:presLayoutVars>
+      </dgm:prSet>
+      <dgm:spPr/>
+    </dgm:pt>
+    <dgm:pt modelId="{DD960DDD-FDE6-47C2-93DA-265FEA2970B1}" type="pres">
+      <dgm:prSet presAssocID="{4A16269B-7C7B-4474-97CE-AFC1466EDE10}" presName="boxAndChildren" presStyleCnt="0"/>
+      <dgm:spPr/>
+    </dgm:pt>
+    <dgm:pt modelId="{CF06D23B-EA1B-45BD-B7C9-FD860FB9E777}" type="pres">
+      <dgm:prSet presAssocID="{4A16269B-7C7B-4474-97CE-AFC1466EDE10}" presName="parentTextBox" presStyleLbl="node1" presStyleIdx="0" presStyleCnt="6"/>
+      <dgm:spPr/>
+      <dgm:t>
+        <a:bodyPr/>
+        <a:lstStyle/>
+        <a:p>
+          <a:endParaRPr lang="en-US"/>
+        </a:p>
+      </dgm:t>
+    </dgm:pt>
+    <dgm:pt modelId="{B5777F49-43E4-4FD9-91D8-6624A34BE6AE}" type="pres">
+      <dgm:prSet presAssocID="{45ACFBF5-AABD-46C3-A451-C306D8232771}" presName="sp" presStyleCnt="0"/>
+      <dgm:spPr/>
+    </dgm:pt>
+    <dgm:pt modelId="{4CD73C01-DA2F-4638-AD74-9A9F5E30789B}" type="pres">
+      <dgm:prSet presAssocID="{EEFDEA95-407A-4A1F-AFDD-493127FBF30F}" presName="arrowAndChildren" presStyleCnt="0"/>
+      <dgm:spPr/>
+    </dgm:pt>
+    <dgm:pt modelId="{4767C477-4346-42B2-A7B7-9EE3C53131AC}" type="pres">
+      <dgm:prSet presAssocID="{EEFDEA95-407A-4A1F-AFDD-493127FBF30F}" presName="parentTextArrow" presStyleLbl="node1" presStyleIdx="1" presStyleCnt="6"/>
+      <dgm:spPr/>
+    </dgm:pt>
+    <dgm:pt modelId="{E7CF5FFF-2088-49AD-B681-2DD8EEE2DD00}" type="pres">
+      <dgm:prSet presAssocID="{0BC6A01E-6AEF-434C-955E-C2BB2848FC9B}" presName="sp" presStyleCnt="0"/>
+      <dgm:spPr/>
+    </dgm:pt>
+    <dgm:pt modelId="{B0020A2D-2EC9-43BA-985D-4E8D44F19C90}" type="pres">
+      <dgm:prSet presAssocID="{D357ED7B-E47C-460E-B5CE-564B291C7146}" presName="arrowAndChildren" presStyleCnt="0"/>
+      <dgm:spPr/>
+    </dgm:pt>
+    <dgm:pt modelId="{D00F070A-EB93-415F-A0CB-220117FB764A}" type="pres">
+      <dgm:prSet presAssocID="{D357ED7B-E47C-460E-B5CE-564B291C7146}" presName="parentTextArrow" presStyleLbl="node1" presStyleIdx="2" presStyleCnt="6"/>
+      <dgm:spPr/>
+      <dgm:t>
+        <a:bodyPr/>
+        <a:lstStyle/>
+        <a:p>
+          <a:endParaRPr lang="en-US"/>
+        </a:p>
+      </dgm:t>
+    </dgm:pt>
+    <dgm:pt modelId="{07BBAF11-E07E-41A1-8CDE-75978AA36FCD}" type="pres">
+      <dgm:prSet presAssocID="{6CA68B76-63DC-41DA-AA6A-28A638DE28AD}" presName="sp" presStyleCnt="0"/>
+      <dgm:spPr/>
+    </dgm:pt>
+    <dgm:pt modelId="{152BBF98-E0C1-4850-9A8D-222CD976E373}" type="pres">
+      <dgm:prSet presAssocID="{316ECE26-8F09-44A1-B5A5-7AE0F5E22ADB}" presName="arrowAndChildren" presStyleCnt="0"/>
+      <dgm:spPr/>
+    </dgm:pt>
+    <dgm:pt modelId="{5B24140B-AFF1-4EDA-A68B-F6C36352C844}" type="pres">
+      <dgm:prSet presAssocID="{316ECE26-8F09-44A1-B5A5-7AE0F5E22ADB}" presName="parentTextArrow" presStyleLbl="node1" presStyleIdx="3" presStyleCnt="6"/>
+      <dgm:spPr/>
+    </dgm:pt>
+    <dgm:pt modelId="{FFB0FA8B-1B1F-4268-A427-F64BF9F9EAF9}" type="pres">
+      <dgm:prSet presAssocID="{2D45C139-E598-4DF1-B41F-C96F3F789955}" presName="sp" presStyleCnt="0"/>
+      <dgm:spPr/>
+    </dgm:pt>
+    <dgm:pt modelId="{12D903FD-846D-4370-99CF-F81E78F22872}" type="pres">
+      <dgm:prSet presAssocID="{B06AF023-242A-4F5C-AA88-07BE2E2B353E}" presName="arrowAndChildren" presStyleCnt="0"/>
+      <dgm:spPr/>
+    </dgm:pt>
+    <dgm:pt modelId="{00AB4653-12B8-43A0-850A-BDA71FC8B86A}" type="pres">
+      <dgm:prSet presAssocID="{B06AF023-242A-4F5C-AA88-07BE2E2B353E}" presName="parentTextArrow" presStyleLbl="node1" presStyleIdx="4" presStyleCnt="6"/>
+      <dgm:spPr/>
+    </dgm:pt>
+    <dgm:pt modelId="{1900148E-80A7-41EE-BCD2-9D98C7B0763C}" type="pres">
+      <dgm:prSet presAssocID="{620FDFFB-0C6C-46ED-A425-1CDE45B16C69}" presName="sp" presStyleCnt="0"/>
+      <dgm:spPr/>
+    </dgm:pt>
+    <dgm:pt modelId="{768F38E0-28FB-4EF9-8F02-E5A9870779E5}" type="pres">
+      <dgm:prSet presAssocID="{3478970B-FA43-4934-A712-47DAC7C2E168}" presName="arrowAndChildren" presStyleCnt="0"/>
+      <dgm:spPr/>
+    </dgm:pt>
+    <dgm:pt modelId="{5A10F818-B298-4140-AF85-C9A3DB0D1300}" type="pres">
+      <dgm:prSet presAssocID="{3478970B-FA43-4934-A712-47DAC7C2E168}" presName="parentTextArrow" presStyleLbl="node1" presStyleIdx="5" presStyleCnt="6"/>
+      <dgm:spPr/>
+    </dgm:pt>
+  </dgm:ptLst>
+  <dgm:cxnLst>
+    <dgm:cxn modelId="{04770F07-2A24-42C9-8AC7-95F2F48D18F1}" type="presOf" srcId="{3478970B-FA43-4934-A712-47DAC7C2E168}" destId="{5A10F818-B298-4140-AF85-C9A3DB0D1300}" srcOrd="0" destOrd="0" presId="urn:microsoft.com/office/officeart/2005/8/layout/process4"/>
+    <dgm:cxn modelId="{7D8A6C12-1E29-47E0-A143-A30060346C65}" srcId="{0AF453FB-BFF9-4355-ADE3-C15BFE6FF0BB}" destId="{D357ED7B-E47C-460E-B5CE-564B291C7146}" srcOrd="3" destOrd="0" parTransId="{D41A99EE-6068-41C8-8FC8-714FE5A7306A}" sibTransId="{0BC6A01E-6AEF-434C-955E-C2BB2848FC9B}"/>
+    <dgm:cxn modelId="{5F026ACF-5A2E-4E12-91D8-9831AA95C3CB}" type="presOf" srcId="{D357ED7B-E47C-460E-B5CE-564B291C7146}" destId="{D00F070A-EB93-415F-A0CB-220117FB764A}" srcOrd="0" destOrd="0" presId="urn:microsoft.com/office/officeart/2005/8/layout/process4"/>
+    <dgm:cxn modelId="{D0499684-E999-4885-9A24-BCD850E4FED5}" srcId="{0AF453FB-BFF9-4355-ADE3-C15BFE6FF0BB}" destId="{3478970B-FA43-4934-A712-47DAC7C2E168}" srcOrd="0" destOrd="0" parTransId="{BB46A3DB-A22E-47CE-9A60-0FEF73FFD5C7}" sibTransId="{620FDFFB-0C6C-46ED-A425-1CDE45B16C69}"/>
+    <dgm:cxn modelId="{FA7AA231-02B2-48C1-AB16-B9D51F7B6770}" type="presOf" srcId="{4A16269B-7C7B-4474-97CE-AFC1466EDE10}" destId="{CF06D23B-EA1B-45BD-B7C9-FD860FB9E777}" srcOrd="0" destOrd="0" presId="urn:microsoft.com/office/officeart/2005/8/layout/process4"/>
+    <dgm:cxn modelId="{CE31A069-821F-4F98-A67F-57D1A3D6A8E4}" type="presOf" srcId="{EEFDEA95-407A-4A1F-AFDD-493127FBF30F}" destId="{4767C477-4346-42B2-A7B7-9EE3C53131AC}" srcOrd="0" destOrd="0" presId="urn:microsoft.com/office/officeart/2005/8/layout/process4"/>
+    <dgm:cxn modelId="{F25EC069-0563-4842-A141-ACD94D73AE3F}" srcId="{0AF453FB-BFF9-4355-ADE3-C15BFE6FF0BB}" destId="{316ECE26-8F09-44A1-B5A5-7AE0F5E22ADB}" srcOrd="2" destOrd="0" parTransId="{17F53CA9-01B0-41A6-B718-DD04868A9AF1}" sibTransId="{6CA68B76-63DC-41DA-AA6A-28A638DE28AD}"/>
+    <dgm:cxn modelId="{D1AB8EE1-F56D-4FAA-89E1-49A634E03A45}" srcId="{0AF453FB-BFF9-4355-ADE3-C15BFE6FF0BB}" destId="{EEFDEA95-407A-4A1F-AFDD-493127FBF30F}" srcOrd="4" destOrd="0" parTransId="{D6EDE99F-8FFD-49F2-9C76-CCE76F2F93AB}" sibTransId="{45ACFBF5-AABD-46C3-A451-C306D8232771}"/>
+    <dgm:cxn modelId="{91C7B2D0-EB04-47C3-980B-0E7AB7BA713E}" srcId="{0AF453FB-BFF9-4355-ADE3-C15BFE6FF0BB}" destId="{B06AF023-242A-4F5C-AA88-07BE2E2B353E}" srcOrd="1" destOrd="0" parTransId="{0B365306-A1CA-48F3-90CA-2CB4D97FB59F}" sibTransId="{2D45C139-E598-4DF1-B41F-C96F3F789955}"/>
+    <dgm:cxn modelId="{64DF8555-4A51-4598-96C7-3EF39223847D}" type="presOf" srcId="{316ECE26-8F09-44A1-B5A5-7AE0F5E22ADB}" destId="{5B24140B-AFF1-4EDA-A68B-F6C36352C844}" srcOrd="0" destOrd="0" presId="urn:microsoft.com/office/officeart/2005/8/layout/process4"/>
+    <dgm:cxn modelId="{390682CD-5941-4E82-9C4E-D22D6A5DB03F}" srcId="{0AF453FB-BFF9-4355-ADE3-C15BFE6FF0BB}" destId="{4A16269B-7C7B-4474-97CE-AFC1466EDE10}" srcOrd="5" destOrd="0" parTransId="{881C9D84-5CDD-4D32-97FE-F6F0EA5BF2F1}" sibTransId="{F371E34A-A096-4F1D-8845-4489C27BEFF3}"/>
+    <dgm:cxn modelId="{3972235F-B71F-4D92-8BE1-00B098D24690}" type="presOf" srcId="{0AF453FB-BFF9-4355-ADE3-C15BFE6FF0BB}" destId="{5CFC4887-7B9E-49BC-8B17-CB46EAF614B3}" srcOrd="0" destOrd="0" presId="urn:microsoft.com/office/officeart/2005/8/layout/process4"/>
+    <dgm:cxn modelId="{BBAA4DA0-9D47-4D66-82AC-19EC7E2C7744}" type="presOf" srcId="{B06AF023-242A-4F5C-AA88-07BE2E2B353E}" destId="{00AB4653-12B8-43A0-850A-BDA71FC8B86A}" srcOrd="0" destOrd="0" presId="urn:microsoft.com/office/officeart/2005/8/layout/process4"/>
+    <dgm:cxn modelId="{906672C5-07A4-4D33-948D-9A1885010915}" type="presParOf" srcId="{5CFC4887-7B9E-49BC-8B17-CB46EAF614B3}" destId="{DD960DDD-FDE6-47C2-93DA-265FEA2970B1}" srcOrd="0" destOrd="0" presId="urn:microsoft.com/office/officeart/2005/8/layout/process4"/>
+    <dgm:cxn modelId="{AED00461-BCB3-4875-8619-5D761FA9A3D7}" type="presParOf" srcId="{DD960DDD-FDE6-47C2-93DA-265FEA2970B1}" destId="{CF06D23B-EA1B-45BD-B7C9-FD860FB9E777}" srcOrd="0" destOrd="0" presId="urn:microsoft.com/office/officeart/2005/8/layout/process4"/>
+    <dgm:cxn modelId="{F785B646-56D2-4E23-90C3-E869B81A8F95}" type="presParOf" srcId="{5CFC4887-7B9E-49BC-8B17-CB46EAF614B3}" destId="{B5777F49-43E4-4FD9-91D8-6624A34BE6AE}" srcOrd="1" destOrd="0" presId="urn:microsoft.com/office/officeart/2005/8/layout/process4"/>
+    <dgm:cxn modelId="{BF13D708-467E-4A25-983F-84E2BADCEE59}" type="presParOf" srcId="{5CFC4887-7B9E-49BC-8B17-CB46EAF614B3}" destId="{4CD73C01-DA2F-4638-AD74-9A9F5E30789B}" srcOrd="2" destOrd="0" presId="urn:microsoft.com/office/officeart/2005/8/layout/process4"/>
+    <dgm:cxn modelId="{99B123BB-E7DF-4B5F-955B-2CF857B0EE68}" type="presParOf" srcId="{4CD73C01-DA2F-4638-AD74-9A9F5E30789B}" destId="{4767C477-4346-42B2-A7B7-9EE3C53131AC}" srcOrd="0" destOrd="0" presId="urn:microsoft.com/office/officeart/2005/8/layout/process4"/>
+    <dgm:cxn modelId="{F9D22532-1272-4FBB-9FED-025EA98E7904}" type="presParOf" srcId="{5CFC4887-7B9E-49BC-8B17-CB46EAF614B3}" destId="{E7CF5FFF-2088-49AD-B681-2DD8EEE2DD00}" srcOrd="3" destOrd="0" presId="urn:microsoft.com/office/officeart/2005/8/layout/process4"/>
+    <dgm:cxn modelId="{1934B2A1-560E-4EE4-A06C-D4FD5B662881}" type="presParOf" srcId="{5CFC4887-7B9E-49BC-8B17-CB46EAF614B3}" destId="{B0020A2D-2EC9-43BA-985D-4E8D44F19C90}" srcOrd="4" destOrd="0" presId="urn:microsoft.com/office/officeart/2005/8/layout/process4"/>
+    <dgm:cxn modelId="{DF09F4C6-35C0-4E50-8BBD-04C37C38C0F6}" type="presParOf" srcId="{B0020A2D-2EC9-43BA-985D-4E8D44F19C90}" destId="{D00F070A-EB93-415F-A0CB-220117FB764A}" srcOrd="0" destOrd="0" presId="urn:microsoft.com/office/officeart/2005/8/layout/process4"/>
+    <dgm:cxn modelId="{D2D8377A-9532-4419-AF53-348B955C625B}" type="presParOf" srcId="{5CFC4887-7B9E-49BC-8B17-CB46EAF614B3}" destId="{07BBAF11-E07E-41A1-8CDE-75978AA36FCD}" srcOrd="5" destOrd="0" presId="urn:microsoft.com/office/officeart/2005/8/layout/process4"/>
+    <dgm:cxn modelId="{FEB7F7D1-537F-4397-B665-90637ED98197}" type="presParOf" srcId="{5CFC4887-7B9E-49BC-8B17-CB46EAF614B3}" destId="{152BBF98-E0C1-4850-9A8D-222CD976E373}" srcOrd="6" destOrd="0" presId="urn:microsoft.com/office/officeart/2005/8/layout/process4"/>
+    <dgm:cxn modelId="{25AE00E7-2ED1-4F00-8A85-B5123B88D910}" type="presParOf" srcId="{152BBF98-E0C1-4850-9A8D-222CD976E373}" destId="{5B24140B-AFF1-4EDA-A68B-F6C36352C844}" srcOrd="0" destOrd="0" presId="urn:microsoft.com/office/officeart/2005/8/layout/process4"/>
+    <dgm:cxn modelId="{45D58109-55D5-45F0-A71A-12B32BA10068}" type="presParOf" srcId="{5CFC4887-7B9E-49BC-8B17-CB46EAF614B3}" destId="{FFB0FA8B-1B1F-4268-A427-F64BF9F9EAF9}" srcOrd="7" destOrd="0" presId="urn:microsoft.com/office/officeart/2005/8/layout/process4"/>
+    <dgm:cxn modelId="{146B100B-E7D4-478B-A997-6DF83100ECDC}" type="presParOf" srcId="{5CFC4887-7B9E-49BC-8B17-CB46EAF614B3}" destId="{12D903FD-846D-4370-99CF-F81E78F22872}" srcOrd="8" destOrd="0" presId="urn:microsoft.com/office/officeart/2005/8/layout/process4"/>
+    <dgm:cxn modelId="{94938E73-FE11-40BF-890E-07F1A9A0DE4C}" type="presParOf" srcId="{12D903FD-846D-4370-99CF-F81E78F22872}" destId="{00AB4653-12B8-43A0-850A-BDA71FC8B86A}" srcOrd="0" destOrd="0" presId="urn:microsoft.com/office/officeart/2005/8/layout/process4"/>
+    <dgm:cxn modelId="{408B0D4E-4BD3-44F5-AC21-C01C61E41D4F}" type="presParOf" srcId="{5CFC4887-7B9E-49BC-8B17-CB46EAF614B3}" destId="{1900148E-80A7-41EE-BCD2-9D98C7B0763C}" srcOrd="9" destOrd="0" presId="urn:microsoft.com/office/officeart/2005/8/layout/process4"/>
+    <dgm:cxn modelId="{4D455345-6959-43B6-A83D-F5F0AE12CACD}" type="presParOf" srcId="{5CFC4887-7B9E-49BC-8B17-CB46EAF614B3}" destId="{768F38E0-28FB-4EF9-8F02-E5A9870779E5}" srcOrd="10" destOrd="0" presId="urn:microsoft.com/office/officeart/2005/8/layout/process4"/>
+    <dgm:cxn modelId="{B0586F47-80E7-4346-9620-D53B0A4E9A48}" type="presParOf" srcId="{768F38E0-28FB-4EF9-8F02-E5A9870779E5}" destId="{5A10F818-B298-4140-AF85-C9A3DB0D1300}" srcOrd="0" destOrd="0" presId="urn:microsoft.com/office/officeart/2005/8/layout/process4"/>
+  </dgm:cxnLst>
+  <dgm:bg/>
+  <dgm:whole/>
+</dgm:dataModel>
+</file>
+
+<file path=ppt/diagrams/layout1.xml><?xml version="1.0" encoding="utf-8"?>
+<dgm:layoutDef xmlns:dgm="http://schemas.openxmlformats.org/drawingml/2006/diagram" xmlns:a="http://schemas.openxmlformats.org/drawingml/2006/main" uniqueId="urn:microsoft.com/office/officeart/2005/8/layout/process4">
+  <dgm:title val=""/>
+  <dgm:desc val=""/>
+  <dgm:catLst>
+    <dgm:cat type="process" pri="16000"/>
+    <dgm:cat type="list" pri="20000"/>
+  </dgm:catLst>
+  <dgm:sampData>
+    <dgm:dataModel>
+      <dgm:ptLst>
+        <dgm:pt modelId="0" type="doc"/>
+        <dgm:pt modelId="1">
+          <dgm:prSet phldr="1"/>
+        </dgm:pt>
+        <dgm:pt modelId="11">
+          <dgm:prSet phldr="1"/>
+        </dgm:pt>
+        <dgm:pt modelId="12">
+          <dgm:prSet phldr="1"/>
+        </dgm:pt>
+        <dgm:pt modelId="2">
+          <dgm:prSet phldr="1"/>
+        </dgm:pt>
+        <dgm:pt modelId="21">
+          <dgm:prSet phldr="1"/>
+        </dgm:pt>
+        <dgm:pt modelId="22">
+          <dgm:prSet phldr="1"/>
+        </dgm:pt>
+        <dgm:pt modelId="3">
+          <dgm:prSet phldr="1"/>
+        </dgm:pt>
+        <dgm:pt modelId="31">
+          <dgm:prSet phldr="1"/>
+        </dgm:pt>
+        <dgm:pt modelId="32">
+          <dgm:prSet phldr="1"/>
+        </dgm:pt>
+      </dgm:ptLst>
+      <dgm:cxnLst>
+        <dgm:cxn modelId="4" srcId="0" destId="1" srcOrd="0" destOrd="0"/>
+        <dgm:cxn modelId="5" srcId="0" destId="2" srcOrd="1" destOrd="0"/>
+        <dgm:cxn modelId="6" srcId="0" destId="3" srcOrd="2" destOrd="0"/>
+        <dgm:cxn modelId="13" srcId="1" destId="11" srcOrd="0" destOrd="0"/>
+        <dgm:cxn modelId="14" srcId="1" destId="12" srcOrd="1" destOrd="0"/>
+        <dgm:cxn modelId="23" srcId="2" destId="21" srcOrd="0" destOrd="0"/>
+        <dgm:cxn modelId="24" srcId="2" destId="22" srcOrd="1" destOrd="0"/>
+        <dgm:cxn modelId="33" srcId="3" destId="31" srcOrd="0" destOrd="0"/>
+        <dgm:cxn modelId="34" srcId="3" destId="32" srcOrd="1" destOrd="0"/>
+      </dgm:cxnLst>
+      <dgm:bg/>
+      <dgm:whole/>
+    </dgm:dataModel>
+  </dgm:sampData>
+  <dgm:styleData>
+    <dgm:dataModel>
+      <dgm:ptLst>
+        <dgm:pt modelId="0" type="doc"/>
+        <dgm:pt modelId="1"/>
+        <dgm:pt modelId="11"/>
+        <dgm:pt modelId="2"/>
+        <dgm:pt modelId="21"/>
+      </dgm:ptLst>
+      <dgm:cxnLst>
+        <dgm:cxn modelId="4" srcId="0" destId="1" srcOrd="0" destOrd="0"/>
+        <dgm:cxn modelId="5" srcId="0" destId="2" srcOrd="1" destOrd="0"/>
+        <dgm:cxn modelId="13" srcId="1" destId="11" srcOrd="0" destOrd="0"/>
+        <dgm:cxn modelId="23" srcId="2" destId="21" srcOrd="0" destOrd="0"/>
+      </dgm:cxnLst>
+      <dgm:bg/>
+      <dgm:whole/>
+    </dgm:dataModel>
+  </dgm:styleData>
+  <dgm:clrData>
+    <dgm:dataModel>
+      <dgm:ptLst>
+        <dgm:pt modelId="0" type="doc"/>
+        <dgm:pt modelId="1"/>
+        <dgm:pt modelId="11"/>
+        <dgm:pt modelId="2"/>
+        <dgm:pt modelId="21"/>
+        <dgm:pt modelId="3"/>
+        <dgm:pt modelId="31"/>
+        <dgm:pt modelId="4"/>
+        <dgm:pt modelId="41"/>
+      </dgm:ptLst>
+      <dgm:cxnLst>
+        <dgm:cxn modelId="5" srcId="0" destId="1" srcOrd="0" destOrd="0"/>
+        <dgm:cxn modelId="6" srcId="0" destId="2" srcOrd="1" destOrd="0"/>
+        <dgm:cxn modelId="7" srcId="0" destId="3" srcOrd="2" destOrd="0"/>
+        <dgm:cxn modelId="8" srcId="0" destId="4" srcOrd="3" destOrd="0"/>
+        <dgm:cxn modelId="13" srcId="1" destId="11" srcOrd="0" destOrd="0"/>
+        <dgm:cxn modelId="23" srcId="2" destId="21" srcOrd="0" destOrd="0"/>
+        <dgm:cxn modelId="33" srcId="3" destId="31" srcOrd="0" destOrd="0"/>
+        <dgm:cxn modelId="43" srcId="4" destId="41" srcOrd="0" destOrd="0"/>
+      </dgm:cxnLst>
+      <dgm:bg/>
+      <dgm:whole/>
+    </dgm:dataModel>
+  </dgm:clrData>
+  <dgm:layoutNode name="Name0">
+    <dgm:varLst>
+      <dgm:dir/>
+      <dgm:animLvl val="lvl"/>
+      <dgm:resizeHandles val="exact"/>
+    </dgm:varLst>
+    <dgm:alg type="lin">
+      <dgm:param type="linDir" val="fromB"/>
+    </dgm:alg>
+    <dgm:shape xmlns:r="http://schemas.openxmlformats.org/officeDocument/2006/relationships" r:blip="">
+      <dgm:adjLst/>
+    </dgm:shape>
+    <dgm:presOf/>
+    <dgm:constrLst>
+      <dgm:constr type="h" for="ch" forName="boxAndChildren" refType="h"/>
+      <dgm:constr type="h" for="ch" forName="arrowAndChildren" refType="h" refFor="ch" refForName="boxAndChildren" op="equ" fact="1.538"/>
+      <dgm:constr type="w" for="ch" forName="arrowAndChildren" refType="w"/>
+      <dgm:constr type="w" for="ch" forName="boxAndChildren" refType="w"/>
+      <dgm:constr type="h" for="ch" forName="sp" refType="h" fact="-0.015"/>
+      <dgm:constr type="primFontSz" for="des" forName="parentTextBox" val="65"/>
+      <dgm:constr type="primFontSz" for="des" forName="parentTextArrow" refType="primFontSz" refFor="des" refForName="parentTextBox" op="equ"/>
+      <dgm:constr type="primFontSz" for="des" forName="childTextArrow" val="65"/>
+      <dgm:constr type="primFontSz" for="des" forName="childTextBox" refType="primFontSz" refFor="des" refForName="childTextArrow" op="equ"/>
+    </dgm:constrLst>
+    <dgm:ruleLst/>
+    <dgm:forEach name="Name1" axis="ch" ptType="node" st="-1" step="-1">
+      <dgm:choose name="Name2">
+        <dgm:if name="Name3" axis="self" ptType="node" func="revPos" op="equ" val="1">
+          <dgm:layoutNode name="boxAndChildren">
+            <dgm:alg type="composite"/>
+            <dgm:shape xmlns:r="http://schemas.openxmlformats.org/officeDocument/2006/relationships" r:blip="">
+              <dgm:adjLst/>
+            </dgm:shape>
+            <dgm:presOf/>
+            <dgm:choose name="Name4">
+              <dgm:if name="Name5" axis="ch" ptType="node" func="cnt" op="gte" val="1">
+                <dgm:constrLst>
+                  <dgm:constr type="w" for="ch" forName="parentTextBox" refType="w"/>
+                  <dgm:constr type="h" for="ch" forName="parentTextBox" refType="h" fact="0.54"/>
+                  <dgm:constr type="t" for="ch" forName="parentTextBox"/>
+                  <dgm:constr type="w" for="ch" forName="entireBox" refType="w"/>
+                  <dgm:constr type="h" for="ch" forName="entireBox" refType="h"/>
+                  <dgm:constr type="w" for="ch" forName="descendantBox" refType="w"/>
+                  <dgm:constr type="b" for="ch" forName="descendantBox" refType="h" fact="0.98"/>
+                  <dgm:constr type="h" for="ch" forName="descendantBox" refType="h" fact="0.46"/>
+                </dgm:constrLst>
+              </dgm:if>
+              <dgm:else name="Name6">
+                <dgm:constrLst>
+                  <dgm:constr type="w" for="ch" forName="parentTextBox" refType="w"/>
+                  <dgm:constr type="h" for="ch" forName="parentTextBox" refType="h"/>
+                </dgm:constrLst>
+              </dgm:else>
+            </dgm:choose>
+            <dgm:ruleLst/>
+            <dgm:layoutNode name="parentTextBox">
+              <dgm:alg type="tx"/>
+              <dgm:choose name="Name7">
+                <dgm:if name="Name8" axis="ch" ptType="node" func="cnt" op="gte" val="1">
+                  <dgm:shape xmlns:r="http://schemas.openxmlformats.org/officeDocument/2006/relationships" type="rect" r:blip="" zOrderOff="1" hideGeom="1">
+                    <dgm:adjLst/>
+                  </dgm:shape>
+                </dgm:if>
+                <dgm:else name="Name9">
+                  <dgm:shape xmlns:r="http://schemas.openxmlformats.org/officeDocument/2006/relationships" type="rect" r:blip="">
+                    <dgm:adjLst/>
+                  </dgm:shape>
+                </dgm:else>
+              </dgm:choose>
+              <dgm:presOf axis="self"/>
+              <dgm:constrLst/>
+              <dgm:ruleLst>
+                <dgm:rule type="primFontSz" val="5" fact="NaN" max="NaN"/>
+              </dgm:ruleLst>
+            </dgm:layoutNode>
+            <dgm:choose name="Name10">
+              <dgm:if name="Name11" axis="ch" ptType="node" func="cnt" op="gte" val="1">
+                <dgm:layoutNode name="entireBox">
+                  <dgm:alg type="sp"/>
+                  <dgm:shape xmlns:r="http://schemas.openxmlformats.org/officeDocument/2006/relationships" type="rect" r:blip="">
+                    <dgm:adjLst/>
+                  </dgm:shape>
+                  <dgm:presOf axis="self"/>
+                  <dgm:constrLst/>
+                  <dgm:ruleLst/>
+                </dgm:layoutNode>
+                <dgm:layoutNode name="descendantBox" styleLbl="fgAccFollowNode1">
+                  <dgm:choose name="Name12">
+                    <dgm:if name="Name13" func="var" arg="dir" op="equ" val="norm">
+                      <dgm:alg type="lin"/>
+                    </dgm:if>
+                    <dgm:else name="Name14">
+                      <dgm:alg type="lin">
+                        <dgm:param type="linDir" val="fromR"/>
+                      </dgm:alg>
+                    </dgm:else>
+                  </dgm:choose>
+                  <dgm:shape xmlns:r="http://schemas.openxmlformats.org/officeDocument/2006/relationships" r:blip="">
+                    <dgm:adjLst/>
+                  </dgm:shape>
+                  <dgm:presOf/>
+                  <dgm:constrLst>
+                    <dgm:constr type="w" for="ch" forName="childTextBox" refType="w"/>
+                    <dgm:constr type="h" for="ch" forName="childTextBox" refType="h"/>
+                  </dgm:constrLst>
+                  <dgm:ruleLst/>
+                  <dgm:forEach name="Name15" axis="ch" ptType="node">
+                    <dgm:layoutNode name="childTextBox" styleLbl="fgAccFollowNode1">
+                      <dgm:varLst>
+                        <dgm:bulletEnabled val="1"/>
+                      </dgm:varLst>
+                      <dgm:alg type="tx"/>
+                      <dgm:shape xmlns:r="http://schemas.openxmlformats.org/officeDocument/2006/relationships" type="rect" r:blip="">
+                        <dgm:adjLst/>
+                      </dgm:shape>
+                      <dgm:presOf axis="desOrSelf" ptType="node"/>
+                      <dgm:constrLst>
+                        <dgm:constr type="tMarg" refType="primFontSz" fact="0.1"/>
+                        <dgm:constr type="bMarg" refType="primFontSz" fact="0.1"/>
+                      </dgm:constrLst>
+                      <dgm:ruleLst>
+                        <dgm:rule type="primFontSz" val="5" fact="NaN" max="NaN"/>
+                      </dgm:ruleLst>
+                    </dgm:layoutNode>
+                  </dgm:forEach>
+                </dgm:layoutNode>
+              </dgm:if>
+              <dgm:else name="Name16"/>
+            </dgm:choose>
+          </dgm:layoutNode>
+        </dgm:if>
+        <dgm:else name="Name17">
+          <dgm:layoutNode name="arrowAndChildren">
+            <dgm:alg type="composite"/>
+            <dgm:shape xmlns:r="http://schemas.openxmlformats.org/officeDocument/2006/relationships" r:blip="">
+              <dgm:adjLst/>
+            </dgm:shape>
+            <dgm:presOf/>
+            <dgm:choose name="Name18">
+              <dgm:if name="Name19" axis="ch" ptType="node" func="cnt" op="gte" val="1">
+                <dgm:constrLst>
+                  <dgm:constr type="w" for="ch" forName="parentTextArrow" refType="w"/>
+                  <dgm:constr type="t" for="ch" forName="parentTextArrow"/>
+                  <dgm:constr type="h" for="ch" forName="parentTextArrow" refType="h" fact="0.351"/>
+                  <dgm:constr type="w" for="ch" forName="arrow" refType="w"/>
+                  <dgm:constr type="h" for="ch" forName="arrow" refType="h"/>
+                  <dgm:constr type="w" for="ch" forName="descendantArrow" refType="w"/>
+                  <dgm:constr type="b" for="ch" forName="descendantArrow" refType="h" fact="0.65"/>
+                  <dgm:constr type="h" for="ch" forName="descendantArrow" refType="h" fact="0.299"/>
+                </dgm:constrLst>
+              </dgm:if>
+              <dgm:else name="Name20">
+                <dgm:constrLst>
+                  <dgm:constr type="w" for="ch" forName="parentTextArrow" refType="w"/>
+                  <dgm:constr type="h" for="ch" forName="parentTextArrow" refType="h"/>
+                </dgm:constrLst>
+              </dgm:else>
+            </dgm:choose>
+            <dgm:ruleLst/>
+            <dgm:layoutNode name="parentTextArrow">
+              <dgm:alg type="tx"/>
+              <dgm:choose name="Name21">
+                <dgm:if name="Name22" axis="ch" ptType="node" func="cnt" op="gte" val="1">
+                  <dgm:shape xmlns:r="http://schemas.openxmlformats.org/officeDocument/2006/relationships" type="rect" r:blip="" zOrderOff="1" hideGeom="1">
+                    <dgm:adjLst/>
+                  </dgm:shape>
+                </dgm:if>
+                <dgm:else name="Name23">
+                  <dgm:shape xmlns:r="http://schemas.openxmlformats.org/officeDocument/2006/relationships" rot="180" type="upArrowCallout" r:blip="">
+                    <dgm:adjLst/>
+                  </dgm:shape>
+                </dgm:else>
+              </dgm:choose>
+              <dgm:presOf axis="self"/>
+              <dgm:constrLst/>
+              <dgm:ruleLst>
+                <dgm:rule type="primFontSz" val="5" fact="NaN" max="NaN"/>
+              </dgm:ruleLst>
+            </dgm:layoutNode>
+            <dgm:choose name="Name24">
+              <dgm:if name="Name25" axis="ch" ptType="node" func="cnt" op="gte" val="1">
+                <dgm:layoutNode name="arrow">
+                  <dgm:alg type="sp"/>
+                  <dgm:shape xmlns:r="http://schemas.openxmlformats.org/officeDocument/2006/relationships" rot="180" type="upArrowCallout" r:blip="">
+                    <dgm:adjLst/>
+                  </dgm:shape>
+                  <dgm:presOf axis="self"/>
+                  <dgm:constrLst/>
+                  <dgm:ruleLst/>
+                </dgm:layoutNode>
+                <dgm:layoutNode name="descendantArrow">
+                  <dgm:choose name="Name26">
+                    <dgm:if name="Name27" func="var" arg="dir" op="equ" val="norm">
+                      <dgm:alg type="lin"/>
+                    </dgm:if>
+                    <dgm:else name="Name28">
+                      <dgm:alg type="lin">
+                        <dgm:param type="linDir" val="fromR"/>
+                      </dgm:alg>
+                    </dgm:else>
+                  </dgm:choose>
+                  <dgm:shape xmlns:r="http://schemas.openxmlformats.org/officeDocument/2006/relationships" r:blip="">
+                    <dgm:adjLst/>
+                  </dgm:shape>
+                  <dgm:presOf/>
+                  <dgm:constrLst>
+                    <dgm:constr type="w" for="ch" forName="childTextArrow" refType="w"/>
+                    <dgm:constr type="h" for="ch" forName="childTextArrow" refType="h"/>
+                  </dgm:constrLst>
+                  <dgm:ruleLst/>
+                  <dgm:forEach name="Name29" axis="ch" ptType="node">
+                    <dgm:layoutNode name="childTextArrow" styleLbl="fgAccFollowNode1">
+                      <dgm:varLst>
+                        <dgm:bulletEnabled val="1"/>
+                      </dgm:varLst>
+                      <dgm:alg type="tx"/>
+                      <dgm:shape xmlns:r="http://schemas.openxmlformats.org/officeDocument/2006/relationships" type="rect" r:blip="">
+                        <dgm:adjLst/>
+                      </dgm:shape>
+                      <dgm:presOf axis="desOrSelf" ptType="node"/>
+                      <dgm:constrLst>
+                        <dgm:constr type="tMarg" refType="primFontSz" fact="0.1"/>
+                        <dgm:constr type="bMarg" refType="primFontSz" fact="0.1"/>
+                      </dgm:constrLst>
+                      <dgm:ruleLst>
+                        <dgm:rule type="primFontSz" val="5" fact="NaN" max="NaN"/>
+                      </dgm:ruleLst>
+                    </dgm:layoutNode>
+                  </dgm:forEach>
+                </dgm:layoutNode>
+              </dgm:if>
+              <dgm:else name="Name30"/>
+            </dgm:choose>
+          </dgm:layoutNode>
+        </dgm:else>
+      </dgm:choose>
+      <dgm:forEach name="Name31" axis="precedSib" ptType="sibTrans" st="-1" cnt="1">
+        <dgm:layoutNode name="sp">
+          <dgm:alg type="sp"/>
+          <dgm:shape xmlns:r="http://schemas.openxmlformats.org/officeDocument/2006/relationships" r:blip="">
+            <dgm:adjLst/>
+          </dgm:shape>
+          <dgm:presOf axis="self"/>
+          <dgm:constrLst/>
+          <dgm:ruleLst/>
+        </dgm:layoutNode>
+      </dgm:forEach>
+    </dgm:forEach>
+  </dgm:layoutNode>
+</dgm:layoutDef>
+</file>
+
+<file path=ppt/diagrams/quickStyle1.xml><?xml version="1.0" encoding="utf-8"?>
+<dgm:styleDef xmlns:dgm="http://schemas.openxmlformats.org/drawingml/2006/diagram" xmlns:a="http://schemas.openxmlformats.org/drawingml/2006/main" uniqueId="urn:microsoft.com/office/officeart/2005/8/quickstyle/simple1">
+  <dgm:title val=""/>
+  <dgm:desc val=""/>
+  <dgm:catLst>
+    <dgm:cat type="simple" pri="10100"/>
+  </dgm:catLst>
+  <dgm:scene3d>
+    <a:camera prst="orthographicFront"/>
+    <a:lightRig rig="threePt" dir="t"/>
+  </dgm:scene3d>
+  <dgm:styleLbl name="node0">
+    <dgm:scene3d>
+      <a:camera prst="orthographicFront"/>
+      <a:lightRig rig="threePt" dir="t"/>
+    </dgm:scene3d>
+    <dgm:sp3d/>
+    <dgm:txPr/>
+    <dgm:style>
+      <a:lnRef idx="2">
+        <a:scrgbClr r="0" g="0" b="0"/>
+      </a:lnRef>
+      <a:fillRef idx="1">
+        <a:scrgbClr r="0" g="0" b="0"/>
+      </a:fillRef>
+      <a:effectRef idx="0">
+        <a:scrgbClr r="0" g="0" b="0"/>
+      </a:effectRef>
+      <a:fontRef idx="minor">
+        <a:schemeClr val="lt1"/>
+      </a:fontRef>
+    </dgm:style>
+  </dgm:styleLbl>
+  <dgm:styleLbl name="lnNode1">
+    <dgm:scene3d>
+      <a:camera prst="orthographicFront"/>
+      <a:lightRig rig="threePt" dir="t"/>
+    </dgm:scene3d>
+    <dgm:sp3d/>
+    <dgm:txPr/>
+    <dgm:style>
+      <a:lnRef idx="2">
+        <a:scrgbClr r="0" g="0" b="0"/>
+      </a:lnRef>
+      <a:fillRef idx="1">
+        <a:scrgbClr r="0" g="0" b="0"/>
+      </a:fillRef>
+      <a:effectRef idx="0">
+        <a:scrgbClr r="0" g="0" b="0"/>
+      </a:effectRef>
+      <a:fontRef idx="minor">
+        <a:schemeClr val="lt1"/>
+      </a:fontRef>
+    </dgm:style>
+  </dgm:styleLbl>
+  <dgm:styleLbl name="vennNode1">
+    <dgm:scene3d>
+      <a:camera prst="orthographicFront"/>
+      <a:lightRig rig="threePt" dir="t"/>
+    </dgm:scene3d>
+    <dgm:sp3d/>
+    <dgm:txPr/>
+    <dgm:style>
+      <a:lnRef idx="2">
+        <a:scrgbClr r="0" g="0" b="0"/>
+      </a:lnRef>
+      <a:fillRef idx="1">
+        <a:scrgbClr r="0" g="0" b="0"/>
+      </a:fillRef>
+      <a:effectRef idx="0">
+        <a:scrgbClr r="0" g="0" b="0"/>
+      </a:effectRef>
+      <a:fontRef idx="minor">
+        <a:schemeClr val="tx1"/>
+      </a:fontRef>
+    </dgm:style>
+  </dgm:styleLbl>
+  <dgm:styleLbl name="alignNode1">
+    <dgm:scene3d>
+      <a:camera prst="orthographicFront"/>
+      <a:lightRig rig="threePt" dir="t"/>
+    </dgm:scene3d>
+    <dgm:sp3d/>
+    <dgm:txPr/>
+    <dgm:style>
+      <a:lnRef idx="2">
+        <a:scrgbClr r="0" g="0" b="0"/>
+      </a:lnRef>
+      <a:fillRef idx="1">
+        <a:scrgbClr r="0" g="0" b="0"/>
+      </a:fillRef>
+      <a:effectRef idx="0">
+        <a:scrgbClr r="0" g="0" b="0"/>
+      </a:effectRef>
+      <a:fontRef idx="minor">
+        <a:schemeClr val="lt1"/>
+      </a:fontRef>
+    </dgm:style>
+  </dgm:styleLbl>
+  <dgm:styleLbl name="node1">
+    <dgm:scene3d>
+      <a:camera prst="orthographicFront"/>
+      <a:lightRig rig="threePt" dir="t"/>
+    </dgm:scene3d>
+    <dgm:sp3d/>
+    <dgm:txPr/>
+    <dgm:style>
+      <a:lnRef idx="2">
+        <a:scrgbClr r="0" g="0" b="0"/>
+      </a:lnRef>
+      <a:fillRef idx="1">
+        <a:scrgbClr r="0" g="0" b="0"/>
+      </a:fillRef>
+      <a:effectRef idx="0">
+        <a:scrgbClr r="0" g="0" b="0"/>
+      </a:effectRef>
+      <a:fontRef idx="minor">
+        <a:schemeClr val="lt1"/>
+      </a:fontRef>
+    </dgm:style>
+  </dgm:styleLbl>
+  <dgm:styleLbl name="node2">
+    <dgm:scene3d>
+      <a:camera prst="orthographicFront"/>
+      <a:lightRig rig="threePt" dir="t"/>
+    </dgm:scene3d>
+    <dgm:sp3d/>
+    <dgm:txPr/>
+    <dgm:style>
+      <a:lnRef idx="2">
+        <a:scrgbClr r="0" g="0" b="0"/>
+      </a:lnRef>
+      <a:fillRef idx="1">
+        <a:scrgbClr r="0" g="0" b="0"/>
+      </a:fillRef>
+      <a:effectRef idx="0">
+        <a:scrgbClr r="0" g="0" b="0"/>
+      </a:effectRef>
+      <a:fontRef idx="minor">
+        <a:schemeClr val="lt1"/>
+      </a:fontRef>
+    </dgm:style>
+  </dgm:styleLbl>
+  <dgm:styleLbl name="node3">
+    <dgm:scene3d>
+      <a:camera prst="orthographicFront"/>
+      <a:lightRig rig="threePt" dir="t"/>
+    </dgm:scene3d>
+    <dgm:sp3d/>
+    <dgm:txPr/>
+    <dgm:style>
+      <a:lnRef idx="2">
+        <a:scrgbClr r="0" g="0" b="0"/>
+      </a:lnRef>
+      <a:fillRef idx="1">
+        <a:scrgbClr r="0" g="0" b="0"/>
+      </a:fillRef>
+      <a:effectRef idx="0">
+        <a:scrgbClr r="0" g="0" b="0"/>
+      </a:effectRef>
+      <a:fontRef idx="minor">
+        <a:schemeClr val="lt1"/>
+      </a:fontRef>
+    </dgm:style>
+  </dgm:styleLbl>
+  <dgm:styleLbl name="node4">
+    <dgm:scene3d>
+      <a:camera prst="orthographicFront"/>
+      <a:lightRig rig="threePt" dir="t"/>
+    </dgm:scene3d>
+    <dgm:sp3d/>
+    <dgm:txPr/>
+    <dgm:style>
+      <a:lnRef idx="2">
+        <a:scrgbClr r="0" g="0" b="0"/>
+      </a:lnRef>
+      <a:fillRef idx="1">
+        <a:scrgbClr r="0" g="0" b="0"/>
+      </a:fillRef>
+      <a:effectRef idx="0">
+        <a:scrgbClr r="0" g="0" b="0"/>
+      </a:effectRef>
+      <a:fontRef idx="minor">
+        <a:schemeClr val="lt1"/>
+      </a:fontRef>
+    </dgm:style>
+  </dgm:styleLbl>
+  <dgm:styleLbl name="fgImgPlace1">
+    <dgm:scene3d>
+      <a:camera prst="orthographicFront"/>
+      <a:lightRig rig="threePt" dir="t"/>
+    </dgm:scene3d>
+    <dgm:sp3d/>
+    <dgm:txPr/>
+    <dgm:style>
+      <a:lnRef idx="2">
+        <a:scrgbClr r="0" g="0" b="0"/>
+      </a:lnRef>
+      <a:fillRef idx="1">
+        <a:scrgbClr r="0" g="0" b="0"/>
+      </a:fillRef>
+      <a:effectRef idx="0">
+        <a:scrgbClr r="0" g="0" b="0"/>
+      </a:effectRef>
+      <a:fontRef idx="minor"/>
+    </dgm:style>
+  </dgm:styleLbl>
+  <dgm:styleLbl name="alignImgPlace1">
+    <dgm:scene3d>
+      <a:camera prst="orthographicFront"/>
+      <a:lightRig rig="threePt" dir="t"/>
+    </dgm:scene3d>
+    <dgm:sp3d/>
+    <dgm:txPr/>
+    <dgm:style>
+      <a:lnRef idx="2">
+        <a:scrgbClr r="0" g="0" b="0"/>
+      </a:lnRef>
+      <a:fillRef idx="1">
+        <a:scrgbClr r="0" g="0" b="0"/>
+      </a:fillRef>
+      <a:effectRef idx="0">
+        <a:scrgbClr r="0" g="0" b="0"/>
+      </a:effectRef>
+      <a:fontRef idx="minor"/>
+    </dgm:style>
+  </dgm:styleLbl>
+  <dgm:styleLbl name="bgImgPlace1">
+    <dgm:scene3d>
+      <a:camera prst="orthographicFront"/>
+      <a:lightRig rig="threePt" dir="t"/>
+    </dgm:scene3d>
+    <dgm:sp3d/>
+    <dgm:txPr/>
+    <dgm:style>
+      <a:lnRef idx="2">
+        <a:scrgbClr r="0" g="0" b="0"/>
+      </a:lnRef>
+      <a:fillRef idx="1">
+        <a:scrgbClr r="0" g="0" b="0"/>
+      </a:fillRef>
+      <a:effectRef idx="0">
+        <a:scrgbClr r="0" g="0" b="0"/>
+      </a:effectRef>
+      <a:fontRef idx="minor"/>
+    </dgm:style>
+  </dgm:styleLbl>
+  <dgm:styleLbl name="sibTrans2D1">
+    <dgm:scene3d>
+      <a:camera prst="orthographicFront"/>
+      <a:lightRig rig="threePt" dir="t"/>
+    </dgm:scene3d>
+    <dgm:sp3d/>
+    <dgm:txPr/>
+    <dgm:style>
+      <a:lnRef idx="0">
+        <a:scrgbClr r="0" g="0" b="0"/>
+      </a:lnRef>
+      <a:fillRef idx="1">
+        <a:scrgbClr r="0" g="0" b="0"/>
+      </a:fillRef>
+      <a:effectRef idx="0">
+        <a:scrgbClr r="0" g="0" b="0"/>
+      </a:effectRef>
+      <a:fontRef idx="minor">
+        <a:schemeClr val="lt1"/>
+      </a:fontRef>
+    </dgm:style>
+  </dgm:styleLbl>
+  <dgm:styleLbl name="fgSibTrans2D1">
+    <dgm:scene3d>
+      <a:camera prst="orthographicFront"/>
+      <a:lightRig rig="threePt" dir="t"/>
+    </dgm:scene3d>
+    <dgm:sp3d/>
+    <dgm:txPr/>
+    <dgm:style>
+      <a:lnRef idx="0">
+        <a:scrgbClr r="0" g="0" b="0"/>
+      </a:lnRef>
+      <a:fillRef idx="1">
+        <a:scrgbClr r="0" g="0" b="0"/>
+      </a:fillRef>
+      <a:effectRef idx="0">
+        <a:scrgbClr r="0" g="0" b="0"/>
+      </a:effectRef>
+      <a:fontRef idx="minor">
+        <a:schemeClr val="lt1"/>
+      </a:fontRef>
+    </dgm:style>
+  </dgm:styleLbl>
+  <dgm:styleLbl name="bgSibTrans2D1">
+    <dgm:scene3d>
+      <a:camera prst="orthographicFront"/>
+      <a:lightRig rig="threePt" dir="t"/>
+    </dgm:scene3d>
+    <dgm:sp3d/>
+    <dgm:txPr/>
+    <dgm:style>
+      <a:lnRef idx="0">
+        <a:scrgbClr r="0" g="0" b="0"/>
+      </a:lnRef>
+      <a:fillRef idx="1">
+        <a:scrgbClr r="0" g="0" b="0"/>
+      </a:fillRef>
+      <a:effectRef idx="0">
+        <a:scrgbClr r="0" g="0" b="0"/>
+      </a:effectRef>
+      <a:fontRef idx="minor">
+        <a:schemeClr val="lt1"/>
+      </a:fontRef>
+    </dgm:style>
+  </dgm:styleLbl>
+  <dgm:styleLbl name="sibTrans1D1">
+    <dgm:scene3d>
+      <a:camera prst="orthographicFront"/>
+      <a:lightRig rig="threePt" dir="t"/>
+    </dgm:scene3d>
+    <dgm:sp3d/>
+    <dgm:txPr/>
+    <dgm:style>
+      <a:lnRef idx="1">
+        <a:scrgbClr r="0" g="0" b="0"/>
+      </a:lnRef>
+      <a:fillRef idx="0">
+        <a:scrgbClr r="0" g="0" b="0"/>
+      </a:fillRef>
+      <a:effectRef idx="0">
+        <a:scrgbClr r="0" g="0" b="0"/>
+      </a:effectRef>
+      <a:fontRef idx="minor"/>
+    </dgm:style>
+  </dgm:styleLbl>
+  <dgm:styleLbl name="callout">
+    <dgm:scene3d>
+      <a:camera prst="orthographicFront"/>
+      <a:lightRig rig="threePt" dir="t"/>
+    </dgm:scene3d>
+    <dgm:sp3d/>
+    <dgm:txPr/>
+    <dgm:style>
+      <a:lnRef idx="2">
+        <a:scrgbClr r="0" g="0" b="0"/>
+      </a:lnRef>
+      <a:fillRef idx="1">
+        <a:scrgbClr r="0" g="0" b="0"/>
+      </a:fillRef>
+      <a:effectRef idx="0">
+        <a:scrgbClr r="0" g="0" b="0"/>
+      </a:effectRef>
+      <a:fontRef idx="minor"/>
+    </dgm:style>
+  </dgm:styleLbl>
+  <dgm:styleLbl name="asst0">
+    <dgm:scene3d>
+      <a:camera prst="orthographicFront"/>
+      <a:lightRig rig="threePt" dir="t"/>
+    </dgm:scene3d>
+    <dgm:sp3d/>
+    <dgm:txPr/>
+    <dgm:style>
+      <a:lnRef idx="2">
+        <a:scrgbClr r="0" g="0" b="0"/>
+      </a:lnRef>
+      <a:fillRef idx="1">
+        <a:scrgbClr r="0" g="0" b="0"/>
+      </a:fillRef>
+      <a:effectRef idx="0">
+        <a:scrgbClr r="0" g="0" b="0"/>
+      </a:effectRef>
+      <a:fontRef idx="minor">
+        <a:schemeClr val="lt1"/>
+      </a:fontRef>
+    </dgm:style>
+  </dgm:styleLbl>
+  <dgm:styleLbl name="asst1">
+    <dgm:scene3d>
+      <a:camera prst="orthographicFront"/>
+      <a:lightRig rig="threePt" dir="t"/>
+    </dgm:scene3d>
+    <dgm:sp3d/>
+    <dgm:txPr/>
+    <dgm:style>
+      <a:lnRef idx="2">
+        <a:scrgbClr r="0" g="0" b="0"/>
+      </a:lnRef>
+      <a:fillRef idx="1">
+        <a:scrgbClr r="0" g="0" b="0"/>
+      </a:fillRef>
+      <a:effectRef idx="0">
+        <a:scrgbClr r="0" g="0" b="0"/>
+      </a:effectRef>
+      <a:fontRef idx="minor">
+        <a:schemeClr val="lt1"/>
+      </a:fontRef>
+    </dgm:style>
+  </dgm:styleLbl>
+  <dgm:styleLbl name="asst2">
+    <dgm:scene3d>
+      <a:camera prst="orthographicFront"/>
+      <a:lightRig rig="threePt" dir="t"/>
+    </dgm:scene3d>
+    <dgm:sp3d/>
+    <dgm:txPr/>
+    <dgm:style>
+      <a:lnRef idx="2">
+        <a:scrgbClr r="0" g="0" b="0"/>
+      </a:lnRef>
+      <a:fillRef idx="1">
+        <a:scrgbClr r="0" g="0" b="0"/>
+      </a:fillRef>
+      <a:effectRef idx="0">
+        <a:scrgbClr r="0" g="0" b="0"/>
+      </a:effectRef>
+      <a:fontRef idx="minor">
+        <a:schemeClr val="lt1"/>
+      </a:fontRef>
+    </dgm:style>
+  </dgm:styleLbl>
+  <dgm:styleLbl name="asst3">
+    <dgm:scene3d>
+      <a:camera prst="orthographicFront"/>
+      <a:lightRig rig="threePt" dir="t"/>
+    </dgm:scene3d>
+    <dgm:sp3d/>
+    <dgm:txPr/>
+    <dgm:style>
+      <a:lnRef idx="2">
+        <a:scrgbClr r="0" g="0" b="0"/>
+      </a:lnRef>
+      <a:fillRef idx="1">
+        <a:scrgbClr r="0" g="0" b="0"/>
+      </a:fillRef>
+      <a:effectRef idx="0">
+        <a:scrgbClr r="0" g="0" b="0"/>
+      </a:effectRef>
+      <a:fontRef idx="minor">
+        <a:schemeClr val="lt1"/>
+      </a:fontRef>
+    </dgm:style>
+  </dgm:styleLbl>
+  <dgm:styleLbl name="asst4">
+    <dgm:scene3d>
+      <a:camera prst="orthographicFront"/>
+      <a:lightRig rig="threePt" dir="t"/>
+    </dgm:scene3d>
+    <dgm:sp3d/>
+    <dgm:txPr/>
+    <dgm:style>
+      <a:lnRef idx="2">
+        <a:scrgbClr r="0" g="0" b="0"/>
+      </a:lnRef>
+      <a:fillRef idx="1">
+        <a:scrgbClr r="0" g="0" b="0"/>
+      </a:fillRef>
+      <a:effectRef idx="0">
+        <a:scrgbClr r="0" g="0" b="0"/>
+      </a:effectRef>
+      <a:fontRef idx="minor">
+        <a:schemeClr val="lt1"/>
+      </a:fontRef>
+    </dgm:style>
+  </dgm:styleLbl>
+  <dgm:styleLbl name="parChTrans2D1">
+    <dgm:scene3d>
+      <a:camera prst="orthographicFront"/>
+      <a:lightRig rig="threePt" dir="t"/>
+    </dgm:scene3d>
+    <dgm:sp3d/>
+    <dgm:txPr/>
+    <dgm:style>
+      <a:lnRef idx="2">
+        <a:scrgbClr r="0" g="0" b="0"/>
+      </a:lnRef>
+      <a:fillRef idx="1">
+        <a:scrgbClr r="0" g="0" b="0"/>
+      </a:fillRef>
+      <a:effectRef idx="0">
+        <a:scrgbClr r="0" g="0" b="0"/>
+      </a:effectRef>
+      <a:fontRef idx="minor">
+        <a:schemeClr val="lt1"/>
+      </a:fontRef>
+    </dgm:style>
+  </dgm:styleLbl>
+  <dgm:styleLbl name="parChTrans2D2">
+    <dgm:scene3d>
+      <a:camera prst="orthographicFront"/>
+      <a:lightRig rig="threePt" dir="t"/>
+    </dgm:scene3d>
+    <dgm:sp3d/>
+    <dgm:txPr/>
+    <dgm:style>
+      <a:lnRef idx="2">
+        <a:scrgbClr r="0" g="0" b="0"/>
+      </a:lnRef>
+      <a:fillRef idx="1">
+        <a:scrgbClr r="0" g="0" b="0"/>
+      </a:fillRef>
+      <a:effectRef idx="0">
+        <a:scrgbClr r="0" g="0" b="0"/>
+      </a:effectRef>
+      <a:fontRef idx="minor">
+        <a:schemeClr val="lt1"/>
+      </a:fontRef>
+    </dgm:style>
+  </dgm:styleLbl>
+  <dgm:styleLbl name="parChTrans2D3">
+    <dgm:scene3d>
+      <a:camera prst="orthographicFront"/>
+      <a:lightRig rig="threePt" dir="t"/>
+    </dgm:scene3d>
+    <dgm:sp3d/>
+    <dgm:txPr/>
+    <dgm:style>
+      <a:lnRef idx="2">
+        <a:scrgbClr r="0" g="0" b="0"/>
+      </a:lnRef>
+      <a:fillRef idx="1">
+        <a:scrgbClr r="0" g="0" b="0"/>
+      </a:fillRef>
+      <a:effectRef idx="0">
+        <a:scrgbClr r="0" g="0" b="0"/>
+      </a:effectRef>
+      <a:fontRef idx="minor">
+        <a:schemeClr val="lt1"/>
+      </a:fontRef>
+    </dgm:style>
+  </dgm:styleLbl>
+  <dgm:styleLbl name="parChTrans2D4">
+    <dgm:scene3d>
+      <a:camera prst="orthographicFront"/>
+      <a:lightRig rig="threePt" dir="t"/>
+    </dgm:scene3d>
+    <dgm:sp3d/>
+    <dgm:txPr/>
+    <dgm:style>
+      <a:lnRef idx="2">
+        <a:scrgbClr r="0" g="0" b="0"/>
+      </a:lnRef>
+      <a:fillRef idx="1">
+        <a:scrgbClr r="0" g="0" b="0"/>
+      </a:fillRef>
+      <a:effectRef idx="0">
+        <a:scrgbClr r="0" g="0" b="0"/>
+      </a:effectRef>
+      <a:fontRef idx="minor">
+        <a:schemeClr val="lt1"/>
+      </a:fontRef>
+    </dgm:style>
+  </dgm:styleLbl>
+  <dgm:styleLbl name="parChTrans1D1">
+    <dgm:scene3d>
+      <a:camera prst="orthographicFront"/>
+      <a:lightRig rig="threePt" dir="t"/>
+    </dgm:scene3d>
+    <dgm:sp3d/>
+    <dgm:txPr/>
+    <dgm:style>
+      <a:lnRef idx="2">
+        <a:scrgbClr r="0" g="0" b="0"/>
+      </a:lnRef>
+      <a:fillRef idx="0">
+        <a:scrgbClr r="0" g="0" b="0"/>
+      </a:fillRef>
+      <a:effectRef idx="0">
+        <a:scrgbClr r="0" g="0" b="0"/>
+      </a:effectRef>
+      <a:fontRef idx="minor"/>
+    </dgm:style>
+  </dgm:styleLbl>
+  <dgm:styleLbl name="parChTrans1D2">
+    <dgm:scene3d>
+      <a:camera prst="orthographicFront"/>
+      <a:lightRig rig="threePt" dir="t"/>
+    </dgm:scene3d>
+    <dgm:sp3d/>
+    <dgm:txPr/>
+    <dgm:style>
+      <a:lnRef idx="2">
+        <a:scrgbClr r="0" g="0" b="0"/>
+      </a:lnRef>
+      <a:fillRef idx="0">
+        <a:scrgbClr r="0" g="0" b="0"/>
+      </a:fillRef>
+      <a:effectRef idx="0">
+        <a:scrgbClr r="0" g="0" b="0"/>
+      </a:effectRef>
+      <a:fontRef idx="minor"/>
+    </dgm:style>
+  </dgm:styleLbl>
+  <dgm:styleLbl name="parChTrans1D3">
+    <dgm:scene3d>
+      <a:camera prst="orthographicFront"/>
+      <a:lightRig rig="threePt" dir="t"/>
+    </dgm:scene3d>
+    <dgm:sp3d/>
+    <dgm:txPr/>
+    <dgm:style>
+      <a:lnRef idx="2">
+        <a:scrgbClr r="0" g="0" b="0"/>
+      </a:lnRef>
+      <a:fillRef idx="0">
+        <a:scrgbClr r="0" g="0" b="0"/>
+      </a:fillRef>
+      <a:effectRef idx="0">
+        <a:scrgbClr r="0" g="0" b="0"/>
+      </a:effectRef>
+      <a:fontRef idx="minor"/>
+    </dgm:style>
+  </dgm:styleLbl>
+  <dgm:styleLbl name="parChTrans1D4">
+    <dgm:scene3d>
+      <a:camera prst="orthographicFront"/>
+      <a:lightRig rig="threePt" dir="t"/>
+    </dgm:scene3d>
+    <dgm:sp3d/>
+    <dgm:txPr/>
+    <dgm:style>
+      <a:lnRef idx="2">
+        <a:scrgbClr r="0" g="0" b="0"/>
+      </a:lnRef>
+      <a:fillRef idx="0">
+        <a:scrgbClr r="0" g="0" b="0"/>
+      </a:fillRef>
+      <a:effectRef idx="0">
+        <a:scrgbClr r="0" g="0" b="0"/>
+      </a:effectRef>
+      <a:fontRef idx="minor"/>
+    </dgm:style>
+  </dgm:styleLbl>
+  <dgm:styleLbl name="fgAcc1">
+    <dgm:scene3d>
+      <a:camera prst="orthographicFront"/>
+      <a:lightRig rig="threePt" dir="t"/>
+    </dgm:scene3d>
+    <dgm:sp3d/>
+    <dgm:txPr/>
+    <dgm:style>
+      <a:lnRef idx="2">
+        <a:scrgbClr r="0" g="0" b="0"/>
+      </a:lnRef>
+      <a:fillRef idx="1">
+        <a:scrgbClr r="0" g="0" b="0"/>
+      </a:fillRef>
+      <a:effectRef idx="0">
+        <a:scrgbClr r="0" g="0" b="0"/>
+      </a:effectRef>
+      <a:fontRef idx="minor"/>
+    </dgm:style>
+  </dgm:styleLbl>
+  <dgm:styleLbl name="conFgAcc1">
+    <dgm:scene3d>
+      <a:camera prst="orthographicFront"/>
+      <a:lightRig rig="threePt" dir="t"/>
+    </dgm:scene3d>
+    <dgm:sp3d/>
+    <dgm:txPr/>
+    <dgm:style>
+      <a:lnRef idx="2">
+        <a:scrgbClr r="0" g="0" b="0"/>
+      </a:lnRef>
+      <a:fillRef idx="1">
+        <a:scrgbClr r="0" g="0" b="0"/>
+      </a:fillRef>
+      <a:effectRef idx="0">
+        <a:scrgbClr r="0" g="0" b="0"/>
+      </a:effectRef>
+      <a:fontRef idx="minor"/>
+    </dgm:style>
+  </dgm:styleLbl>
+  <dgm:styleLbl name="alignAcc1">
+    <dgm:scene3d>
+      <a:camera prst="orthographicFront"/>
+      <a:lightRig rig="threePt" dir="t"/>
+    </dgm:scene3d>
+    <dgm:sp3d/>
+    <dgm:txPr/>
+    <dgm:style>
+      <a:lnRef idx="2">
+        <a:scrgbClr r="0" g="0" b="0"/>
+      </a:lnRef>
+      <a:fillRef idx="1">
+        <a:scrgbClr r="0" g="0" b="0"/>
+      </a:fillRef>
+      <a:effectRef idx="0">
+        <a:scrgbClr r="0" g="0" b="0"/>
+      </a:effectRef>
+      <a:fontRef idx="minor"/>
+    </dgm:style>
+  </dgm:styleLbl>
+  <dgm:styleLbl name="trAlignAcc1">
+    <dgm:scene3d>
+      <a:camera prst="orthographicFront"/>
+      <a:lightRig rig="threePt" dir="t"/>
+    </dgm:scene3d>
+    <dgm:sp3d/>
+    <dgm:txPr/>
+    <dgm:style>
+      <a:lnRef idx="1">
+        <a:scrgbClr r="0" g="0" b="0"/>
+      </a:lnRef>
+      <a:fillRef idx="1">
+        <a:scrgbClr r="0" g="0" b="0"/>
+      </a:fillRef>
+      <a:effectRef idx="0">
+        <a:scrgbClr r="0" g="0" b="0"/>
+      </a:effectRef>
+      <a:fontRef idx="minor"/>
+    </dgm:style>
+  </dgm:styleLbl>
+  <dgm:styleLbl name="bgAcc1">
+    <dgm:scene3d>
+      <a:camera prst="orthographicFront"/>
+      <a:lightRig rig="threePt" dir="t"/>
+    </dgm:scene3d>
+    <dgm:sp3d/>
+    <dgm:txPr/>
+    <dgm:style>
+      <a:lnRef idx="2">
+        <a:scrgbClr r="0" g="0" b="0"/>
+      </a:lnRef>
+      <a:fillRef idx="1">
+        <a:scrgbClr r="0" g="0" b="0"/>
+      </a:fillRef>
+      <a:effectRef idx="0">
+        <a:scrgbClr r="0" g="0" b="0"/>
+      </a:effectRef>
+      <a:fontRef idx="minor"/>
+    </dgm:style>
+  </dgm:styleLbl>
+  <dgm:styleLbl name="solidFgAcc1">
+    <dgm:scene3d>
+      <a:camera prst="orthographicFront"/>
+      <a:lightRig rig="threePt" dir="t"/>
+    </dgm:scene3d>
+    <dgm:sp3d/>
+    <dgm:txPr/>
+    <dgm:style>
+      <a:lnRef idx="2">
+        <a:scrgbClr r="0" g="0" b="0"/>
+      </a:lnRef>
+      <a:fillRef idx="1">
+        <a:scrgbClr r="0" g="0" b="0"/>
+      </a:fillRef>
+      <a:effectRef idx="0">
+        <a:scrgbClr r="0" g="0" b="0"/>
+      </a:effectRef>
+      <a:fontRef idx="minor"/>
+    </dgm:style>
+  </dgm:styleLbl>
+  <dgm:styleLbl name="solidAlignAcc1">
+    <dgm:scene3d>
+      <a:camera prst="orthographicFront"/>
+      <a:lightRig rig="threePt" dir="t"/>
+    </dgm:scene3d>
+    <dgm:sp3d/>
+    <dgm:txPr/>
+    <dgm:style>
+      <a:lnRef idx="2">
+        <a:scrgbClr r="0" g="0" b="0"/>
+      </a:lnRef>
+      <a:fillRef idx="1">
+        <a:scrgbClr r="0" g="0" b="0"/>
+      </a:fillRef>
+      <a:effectRef idx="0">
+        <a:scrgbClr r="0" g="0" b="0"/>
+      </a:effectRef>
+      <a:fontRef idx="minor"/>
+    </dgm:style>
+  </dgm:styleLbl>
+  <dgm:styleLbl name="solidBgAcc1">
+    <dgm:scene3d>
+      <a:camera prst="orthographicFront"/>
+      <a:lightRig rig="threePt" dir="t"/>
+    </dgm:scene3d>
+    <dgm:sp3d/>
+    <dgm:txPr/>
+    <dgm:style>
+      <a:lnRef idx="2">
+        <a:scrgbClr r="0" g="0" b="0"/>
+      </a:lnRef>
+      <a:fillRef idx="1">
+        <a:scrgbClr r="0" g="0" b="0"/>
+      </a:fillRef>
+      <a:effectRef idx="0">
+        <a:scrgbClr r="0" g="0" b="0"/>
+      </a:effectRef>
+      <a:fontRef idx="minor"/>
+    </dgm:style>
+  </dgm:styleLbl>
+  <dgm:styleLbl name="fgAccFollowNode1">
+    <dgm:scene3d>
+      <a:camera prst="orthographicFront"/>
+      <a:lightRig rig="threePt" dir="t"/>
+    </dgm:scene3d>
+    <dgm:sp3d/>
+    <dgm:txPr/>
+    <dgm:style>
+      <a:lnRef idx="2">
+        <a:scrgbClr r="0" g="0" b="0"/>
+      </a:lnRef>
+      <a:fillRef idx="1">
+        <a:scrgbClr r="0" g="0" b="0"/>
+      </a:fillRef>
+      <a:effectRef idx="0">
+        <a:scrgbClr r="0" g="0" b="0"/>
+      </a:effectRef>
+      <a:fontRef idx="minor"/>
+    </dgm:style>
+  </dgm:styleLbl>
+  <dgm:styleLbl name="alignAccFollowNode1">
+    <dgm:scene3d>
+      <a:camera prst="orthographicFront"/>
+      <a:lightRig rig="threePt" dir="t"/>
+    </dgm:scene3d>
+    <dgm:sp3d/>
+    <dgm:txPr/>
+    <dgm:style>
+      <a:lnRef idx="2">
+        <a:scrgbClr r="0" g="0" b="0"/>
+      </a:lnRef>
+      <a:fillRef idx="1">
+        <a:scrgbClr r="0" g="0" b="0"/>
+      </a:fillRef>
+      <a:effectRef idx="0">
+        <a:scrgbClr r="0" g="0" b="0"/>
+      </a:effectRef>
+      <a:fontRef idx="minor"/>
+    </dgm:style>
+  </dgm:styleLbl>
+  <dgm:styleLbl name="bgAccFollowNode1">
+    <dgm:scene3d>
+      <a:camera prst="orthographicFront"/>
+      <a:lightRig rig="threePt" dir="t"/>
+    </dgm:scene3d>
+    <dgm:sp3d/>
+    <dgm:txPr/>
+    <dgm:style>
+      <a:lnRef idx="2">
+        <a:scrgbClr r="0" g="0" b="0"/>
+      </a:lnRef>
+      <a:fillRef idx="1">
+        <a:scrgbClr r="0" g="0" b="0"/>
+      </a:fillRef>
+      <a:effectRef idx="0">
+        <a:scrgbClr r="0" g="0" b="0"/>
+      </a:effectRef>
+      <a:fontRef idx="minor"/>
+    </dgm:style>
+  </dgm:styleLbl>
+  <dgm:styleLbl name="fgAcc0">
+    <dgm:scene3d>
+      <a:camera prst="orthographicFront"/>
+      <a:lightRig rig="threePt" dir="t"/>
+    </dgm:scene3d>
+    <dgm:sp3d/>
+    <dgm:txPr/>
+    <dgm:style>
+      <a:lnRef idx="2">
+        <a:scrgbClr r="0" g="0" b="0"/>
+      </a:lnRef>
+      <a:fillRef idx="1">
+        <a:scrgbClr r="0" g="0" b="0"/>
+      </a:fillRef>
+      <a:effectRef idx="0">
+        <a:scrgbClr r="0" g="0" b="0"/>
+      </a:effectRef>
+      <a:fontRef idx="minor"/>
+    </dgm:style>
+  </dgm:styleLbl>
+  <dgm:styleLbl name="fgAcc2">
+    <dgm:scene3d>
+      <a:camera prst="orthographicFront"/>
+      <a:lightRig rig="threePt" dir="t"/>
+    </dgm:scene3d>
+    <dgm:sp3d/>
+    <dgm:txPr/>
+    <dgm:style>
+      <a:lnRef idx="2">
+        <a:scrgbClr r="0" g="0" b="0"/>
+      </a:lnRef>
+      <a:fillRef idx="1">
+        <a:scrgbClr r="0" g="0" b="0"/>
+      </a:fillRef>
+      <a:effectRef idx="0">
+        <a:scrgbClr r="0" g="0" b="0"/>
+      </a:effectRef>
+      <a:fontRef idx="minor"/>
+    </dgm:style>
+  </dgm:styleLbl>
+  <dgm:styleLbl name="fgAcc3">
+    <dgm:scene3d>
+      <a:camera prst="orthographicFront"/>
+      <a:lightRig rig="threePt" dir="t"/>
+    </dgm:scene3d>
+    <dgm:sp3d/>
+    <dgm:txPr/>
+    <dgm:style>
+      <a:lnRef idx="2">
+        <a:scrgbClr r="0" g="0" b="0"/>
+      </a:lnRef>
+      <a:fillRef idx="1">
+        <a:scrgbClr r="0" g="0" b="0"/>
+      </a:fillRef>
+      <a:effectRef idx="0">
+        <a:scrgbClr r="0" g="0" b="0"/>
+      </a:effectRef>
+      <a:fontRef idx="minor"/>
+    </dgm:style>
+  </dgm:styleLbl>
+  <dgm:styleLbl name="fgAcc4">
+    <dgm:scene3d>
+      <a:camera prst="orthographicFront"/>
+      <a:lightRig rig="threePt" dir="t"/>
+    </dgm:scene3d>
+    <dgm:sp3d/>
+    <dgm:txPr/>
+    <dgm:style>
+      <a:lnRef idx="2">
+        <a:scrgbClr r="0" g="0" b="0"/>
+      </a:lnRef>
+      <a:fillRef idx="1">
+        <a:scrgbClr r="0" g="0" b="0"/>
+      </a:fillRef>
+      <a:effectRef idx="0">
+        <a:scrgbClr r="0" g="0" b="0"/>
+      </a:effectRef>
+      <a:fontRef idx="minor"/>
+    </dgm:style>
+  </dgm:styleLbl>
+  <dgm:styleLbl name="bgShp">
+    <dgm:scene3d>
+      <a:camera prst="orthographicFront"/>
+      <a:lightRig rig="threePt" dir="t"/>
+    </dgm:scene3d>
+    <dgm:sp3d/>
+    <dgm:txPr/>
+    <dgm:style>
+      <a:lnRef idx="0">
+        <a:scrgbClr r="0" g="0" b="0"/>
+      </a:lnRef>
+      <a:fillRef idx="1">
+        <a:scrgbClr r="0" g="0" b="0"/>
+      </a:fillRef>
+      <a:effectRef idx="0">
+        <a:scrgbClr r="0" g="0" b="0"/>
+      </a:effectRef>
+      <a:fontRef idx="minor"/>
+    </dgm:style>
+  </dgm:styleLbl>
+  <dgm:styleLbl name="dkBgShp">
+    <dgm:scene3d>
+      <a:camera prst="orthographicFront"/>
+      <a:lightRig rig="threePt" dir="t"/>
+    </dgm:scene3d>
+    <dgm:sp3d/>
+    <dgm:txPr/>
+    <dgm:style>
+      <a:lnRef idx="0">
+        <a:scrgbClr r="0" g="0" b="0"/>
+      </a:lnRef>
+      <a:fillRef idx="1">
+        <a:scrgbClr r="0" g="0" b="0"/>
+      </a:fillRef>
+      <a:effectRef idx="0">
+        <a:scrgbClr r="0" g="0" b="0"/>
+      </a:effectRef>
+      <a:fontRef idx="minor"/>
+    </dgm:style>
+  </dgm:styleLbl>
+  <dgm:styleLbl name="trBgShp">
+    <dgm:scene3d>
+      <a:camera prst="orthographicFront"/>
+      <a:lightRig rig="threePt" dir="t"/>
+    </dgm:scene3d>
+    <dgm:sp3d/>
+    <dgm:txPr/>
+    <dgm:style>
+      <a:lnRef idx="0">
+        <a:scrgbClr r="0" g="0" b="0"/>
+      </a:lnRef>
+      <a:fillRef idx="1">
+        <a:scrgbClr r="0" g="0" b="0"/>
+      </a:fillRef>
+      <a:effectRef idx="0">
+        <a:scrgbClr r="0" g="0" b="0"/>
+      </a:effectRef>
+      <a:fontRef idx="minor"/>
+    </dgm:style>
+  </dgm:styleLbl>
+  <dgm:styleLbl name="fgShp">
+    <dgm:scene3d>
+      <a:camera prst="orthographicFront"/>
+      <a:lightRig rig="threePt" dir="t"/>
+    </dgm:scene3d>
+    <dgm:sp3d/>
+    <dgm:txPr/>
+    <dgm:style>
+      <a:lnRef idx="2">
+        <a:scrgbClr r="0" g="0" b="0"/>
+      </a:lnRef>
+      <a:fillRef idx="1">
+        <a:scrgbClr r="0" g="0" b="0"/>
+      </a:fillRef>
+      <a:effectRef idx="0">
+        <a:scrgbClr r="0" g="0" b="0"/>
+      </a:effectRef>
+      <a:fontRef idx="minor"/>
+    </dgm:style>
+  </dgm:styleLbl>
+  <dgm:styleLbl name="revTx">
+    <dgm:scene3d>
+      <a:camera prst="orthographicFront"/>
+      <a:lightRig rig="threePt" dir="t"/>
+    </dgm:scene3d>
+    <dgm:sp3d/>
+    <dgm:txPr/>
+    <dgm:style>
+      <a:lnRef idx="0">
+        <a:scrgbClr r="0" g="0" b="0"/>
+      </a:lnRef>
+      <a:fillRef idx="0">
+        <a:scrgbClr r="0" g="0" b="0"/>
+      </a:fillRef>
+      <a:effectRef idx="0">
+        <a:scrgbClr r="0" g="0" b="0"/>
+      </a:effectRef>
+      <a:fontRef idx="minor"/>
+    </dgm:style>
+  </dgm:styleLbl>
+</dgm:styleDef>
 </file>
 
 <file path=ppt/notesMasters/notesMaster1.xml><?xml version="1.0" encoding="utf-8"?>
@@ -6747,8 +9385,8 @@
         </p:nvSpPr>
         <p:spPr>
           <a:xfrm>
-            <a:off x="0" y="971550"/>
-            <a:ext cx="5334000" cy="3429000"/>
+            <a:off x="381000" y="971550"/>
+            <a:ext cx="5181600" cy="3429000"/>
           </a:xfrm>
           <a:prstGeom prst="rect">
             <a:avLst/>
@@ -6760,35 +9398,122 @@
           </a:bodyPr>
           <a:lstStyle/>
           <a:p>
-            <a:pPr indent="0"/>
+            <a:pPr indent="0">
+              <a:lnSpc>
+                <a:spcPct val="200000"/>
+              </a:lnSpc>
+              <a:buFont typeface="Arial" pitchFamily="34" charset="0"/>
+              <a:buChar char="•"/>
+            </a:pPr>
             <a:r>
-              <a:rPr lang="en-US" sz="1600" dirty="0" smtClean="0">
+              <a:rPr lang="en-US" sz="2000" dirty="0" smtClean="0">
                 <a:solidFill>
                   <a:schemeClr val="tx1"/>
                 </a:solidFill>
               </a:rPr>
-              <a:t>While plenty of data was gathered that could result in increased revenue for the company, there is still a vast amount of unexplored data in this database. In the future, I would like to dig deeper into the various shipping options, to determine if one of the shipping companies provides cheaper service than the others, and how much each one may affect the likelihood of a customer returning for more orders.</a:t>
+              <a:t>Vast </a:t>
             </a:r>
-          </a:p>
-          <a:p>
-            <a:pPr indent="0"/>
-            <a:endParaRPr lang="en-US" sz="1600" dirty="0" smtClean="0">
-              <a:solidFill>
-                <a:schemeClr val="tx1"/>
-              </a:solidFill>
-            </a:endParaRPr>
-          </a:p>
-          <a:p>
-            <a:pPr indent="0"/>
             <a:r>
-              <a:rPr lang="en-US" sz="1600" dirty="0" smtClean="0">
+              <a:rPr lang="en-US" sz="2000" dirty="0" smtClean="0">
                 <a:solidFill>
                   <a:schemeClr val="tx1"/>
                 </a:solidFill>
               </a:rPr>
-              <a:t>I would also like to discover more data, possibly filling out the customer demographic tables, to be able to explore that as a stronger indicator than just region on how likely a specific customer is to repeat order.</a:t>
+              <a:t>amount of unexplored </a:t>
             </a:r>
-            <a:endParaRPr lang="en-US" sz="1600" dirty="0">
+            <a:r>
+              <a:rPr lang="en-US" sz="2000" dirty="0" smtClean="0">
+                <a:solidFill>
+                  <a:schemeClr val="tx1"/>
+                </a:solidFill>
+              </a:rPr>
+              <a:t>data</a:t>
+            </a:r>
+          </a:p>
+          <a:p>
+            <a:pPr indent="0">
+              <a:lnSpc>
+                <a:spcPct val="200000"/>
+              </a:lnSpc>
+              <a:buFont typeface="Arial" pitchFamily="34" charset="0"/>
+              <a:buChar char="•"/>
+            </a:pPr>
+            <a:r>
+              <a:rPr lang="en-US" sz="2000" dirty="0" smtClean="0">
+                <a:solidFill>
+                  <a:schemeClr val="tx1"/>
+                </a:solidFill>
+              </a:rPr>
+              <a:t>Dig </a:t>
+            </a:r>
+            <a:r>
+              <a:rPr lang="en-US" sz="2000" dirty="0" smtClean="0">
+                <a:solidFill>
+                  <a:schemeClr val="tx1"/>
+                </a:solidFill>
+              </a:rPr>
+              <a:t>deeper into </a:t>
+            </a:r>
+            <a:r>
+              <a:rPr lang="en-US" sz="2000" dirty="0" smtClean="0">
+                <a:solidFill>
+                  <a:schemeClr val="tx1"/>
+                </a:solidFill>
+              </a:rPr>
+              <a:t>shipping options</a:t>
+            </a:r>
+          </a:p>
+          <a:p>
+            <a:pPr indent="0">
+              <a:lnSpc>
+                <a:spcPct val="200000"/>
+              </a:lnSpc>
+              <a:buFont typeface="Arial" pitchFamily="34" charset="0"/>
+              <a:buChar char="•"/>
+            </a:pPr>
+            <a:r>
+              <a:rPr lang="en-US" sz="2000" dirty="0" smtClean="0">
+                <a:solidFill>
+                  <a:schemeClr val="tx1"/>
+                </a:solidFill>
+              </a:rPr>
+              <a:t>Cheapest Shipping Company</a:t>
+            </a:r>
+          </a:p>
+          <a:p>
+            <a:pPr indent="0">
+              <a:lnSpc>
+                <a:spcPct val="200000"/>
+              </a:lnSpc>
+              <a:buFont typeface="Arial" pitchFamily="34" charset="0"/>
+              <a:buChar char="•"/>
+            </a:pPr>
+            <a:r>
+              <a:rPr lang="en-US" sz="2000" dirty="0" smtClean="0">
+                <a:solidFill>
+                  <a:schemeClr val="tx1"/>
+                </a:solidFill>
+              </a:rPr>
+              <a:t>Customer Demographics</a:t>
+            </a:r>
+          </a:p>
+          <a:p>
+            <a:pPr indent="0">
+              <a:lnSpc>
+                <a:spcPct val="200000"/>
+              </a:lnSpc>
+              <a:buFont typeface="Arial" pitchFamily="34" charset="0"/>
+              <a:buChar char="•"/>
+            </a:pPr>
+            <a:r>
+              <a:rPr lang="en-US" sz="2000" dirty="0" smtClean="0">
+                <a:solidFill>
+                  <a:schemeClr val="tx1"/>
+                </a:solidFill>
+              </a:rPr>
+              <a:t>Stronger Indicators</a:t>
+            </a:r>
+            <a:endParaRPr lang="en-US" sz="2000" dirty="0">
               <a:solidFill>
                 <a:schemeClr val="tx1"/>
               </a:solidFill>
@@ -7201,13 +9926,8 @@
             </a:r>
             <a:r>
               <a:rPr lang="en-US" sz="2000" dirty="0" smtClean="0"/>
-              <a:t> </a:t>
+              <a:t> Sales Representatives</a:t>
             </a:r>
-            <a:r>
-              <a:rPr lang="en-US" sz="2000" dirty="0" smtClean="0"/>
-              <a:t>Sales Representatives</a:t>
-            </a:r>
-            <a:endParaRPr lang="en-US" sz="2000" dirty="0" smtClean="0"/>
           </a:p>
           <a:p>
             <a:pPr lvl="1">
@@ -7226,13 +9946,8 @@
             </a:pPr>
             <a:r>
               <a:rPr lang="en-US" sz="2000" dirty="0" smtClean="0"/>
-              <a:t>$1,265,793 in </a:t>
+              <a:t>$1,265,793 in revenue</a:t>
             </a:r>
-            <a:r>
-              <a:rPr lang="en-US" sz="2000" dirty="0" smtClean="0"/>
-              <a:t>revenue</a:t>
-            </a:r>
-            <a:endParaRPr lang="en-US" sz="2000" dirty="0" smtClean="0"/>
           </a:p>
         </p:txBody>
       </p:sp>
@@ -7363,192 +10078,6 @@
       </p:sp>
       <p:sp>
         <p:nvSpPr>
-          <p:cNvPr id="200" name="Google Shape;200;p30"/>
-          <p:cNvSpPr txBox="1">
-            <a:spLocks noGrp="1"/>
-          </p:cNvSpPr>
-          <p:nvPr>
-            <p:ph type="body" idx="1"/>
-          </p:nvPr>
-        </p:nvSpPr>
-        <p:spPr>
-          <a:xfrm>
-            <a:off x="492675" y="1352550"/>
-            <a:ext cx="1831500" cy="1524000"/>
-          </a:xfrm>
-          <a:prstGeom prst="rect">
-            <a:avLst/>
-          </a:prstGeom>
-        </p:spPr>
-        <p:txBody>
-          <a:bodyPr spcFirstLastPara="1" wrap="square" lIns="91425" tIns="91425" rIns="91425" bIns="91425" anchor="t" anchorCtr="0">
-            <a:noAutofit/>
-          </a:bodyPr>
-          <a:lstStyle/>
-          <a:p>
-            <a:pPr marL="0" lvl="0" indent="0" algn="l" rtl="0">
-              <a:spcBef>
-                <a:spcPts val="600"/>
-              </a:spcBef>
-              <a:spcAft>
-                <a:spcPts val="0"/>
-              </a:spcAft>
-              <a:buNone/>
-            </a:pPr>
-            <a:r>
-              <a:rPr lang="en-US" sz="1100" b="1" dirty="0" smtClean="0"/>
-              <a:t>1: Ask Questions</a:t>
-            </a:r>
-            <a:endParaRPr sz="1100" b="1"/>
-          </a:p>
-          <a:p>
-            <a:pPr marL="0" lvl="0" indent="0" algn="l" rtl="0">
-              <a:spcBef>
-                <a:spcPts val="600"/>
-              </a:spcBef>
-              <a:spcAft>
-                <a:spcPts val="0"/>
-              </a:spcAft>
-              <a:buNone/>
-            </a:pPr>
-            <a:r>
-              <a:rPr lang="en" sz="1100" dirty="0" smtClean="0"/>
-              <a:t>From the data available, what questions do we want to explore?</a:t>
-            </a:r>
-            <a:endParaRPr sz="1100"/>
-          </a:p>
-        </p:txBody>
-      </p:sp>
-      <p:sp>
-        <p:nvSpPr>
-          <p:cNvPr id="201" name="Google Shape;201;p30"/>
-          <p:cNvSpPr txBox="1">
-            <a:spLocks noGrp="1"/>
-          </p:cNvSpPr>
-          <p:nvPr>
-            <p:ph type="body" idx="2"/>
-          </p:nvPr>
-        </p:nvSpPr>
-        <p:spPr>
-          <a:xfrm>
-            <a:off x="2418037" y="1352550"/>
-            <a:ext cx="1831500" cy="1524000"/>
-          </a:xfrm>
-          <a:prstGeom prst="rect">
-            <a:avLst/>
-          </a:prstGeom>
-        </p:spPr>
-        <p:txBody>
-          <a:bodyPr spcFirstLastPara="1" wrap="square" lIns="91425" tIns="91425" rIns="91425" bIns="91425" anchor="t" anchorCtr="0">
-            <a:noAutofit/>
-          </a:bodyPr>
-          <a:lstStyle/>
-          <a:p>
-            <a:pPr marL="0" lvl="0" indent="0" algn="l" rtl="0">
-              <a:spcBef>
-                <a:spcPts val="600"/>
-              </a:spcBef>
-              <a:spcAft>
-                <a:spcPts val="0"/>
-              </a:spcAft>
-              <a:buNone/>
-            </a:pPr>
-            <a:r>
-              <a:rPr lang="en-US" sz="1100" b="1" dirty="0" smtClean="0"/>
-              <a:t>2: Formulate Hypothesis</a:t>
-            </a:r>
-            <a:endParaRPr sz="1100" b="1"/>
-          </a:p>
-          <a:p>
-            <a:pPr marL="0" lvl="0" indent="0" algn="l" rtl="0">
-              <a:spcBef>
-                <a:spcPts val="600"/>
-              </a:spcBef>
-              <a:spcAft>
-                <a:spcPts val="0"/>
-              </a:spcAft>
-              <a:buNone/>
-            </a:pPr>
-            <a:r>
-              <a:rPr lang="en" sz="1100" dirty="0" smtClean="0"/>
-              <a:t>Based on our question, what is it that we want to prove or disprove?</a:t>
-            </a:r>
-            <a:endParaRPr sz="1100"/>
-          </a:p>
-        </p:txBody>
-      </p:sp>
-      <p:sp>
-        <p:nvSpPr>
-          <p:cNvPr id="202" name="Google Shape;202;p30"/>
-          <p:cNvSpPr txBox="1">
-            <a:spLocks noGrp="1"/>
-          </p:cNvSpPr>
-          <p:nvPr>
-            <p:ph type="body" idx="3"/>
-          </p:nvPr>
-        </p:nvSpPr>
-        <p:spPr>
-          <a:xfrm>
-            <a:off x="4343400" y="1352550"/>
-            <a:ext cx="1831500" cy="1524000"/>
-          </a:xfrm>
-          <a:prstGeom prst="rect">
-            <a:avLst/>
-          </a:prstGeom>
-        </p:spPr>
-        <p:txBody>
-          <a:bodyPr spcFirstLastPara="1" wrap="square" lIns="91425" tIns="91425" rIns="91425" bIns="91425" anchor="t" anchorCtr="0">
-            <a:noAutofit/>
-          </a:bodyPr>
-          <a:lstStyle/>
-          <a:p>
-            <a:pPr marL="0" lvl="0" indent="0" algn="l" rtl="0">
-              <a:spcBef>
-                <a:spcPts val="600"/>
-              </a:spcBef>
-              <a:spcAft>
-                <a:spcPts val="0"/>
-              </a:spcAft>
-              <a:buNone/>
-            </a:pPr>
-            <a:r>
-              <a:rPr lang="en-US" sz="1100" b="1" dirty="0" smtClean="0"/>
-              <a:t>3: Gather Data</a:t>
-            </a:r>
-            <a:endParaRPr sz="1100" b="1"/>
-          </a:p>
-          <a:p>
-            <a:pPr marL="0" lvl="0" indent="0" algn="l" rtl="0">
-              <a:spcBef>
-                <a:spcPts val="600"/>
-              </a:spcBef>
-              <a:spcAft>
-                <a:spcPts val="0"/>
-              </a:spcAft>
-              <a:buNone/>
-            </a:pPr>
-            <a:r>
-              <a:rPr lang="en-US" sz="1100" dirty="0" smtClean="0"/>
-              <a:t>Generating the data we need to explore and answer our question.</a:t>
-            </a:r>
-            <a:endParaRPr sz="1100"/>
-          </a:p>
-          <a:p>
-            <a:pPr marL="0" lvl="0" indent="0" algn="l" rtl="0">
-              <a:spcBef>
-                <a:spcPts val="600"/>
-              </a:spcBef>
-              <a:spcAft>
-                <a:spcPts val="0"/>
-              </a:spcAft>
-              <a:buNone/>
-            </a:pPr>
-            <a:endParaRPr sz="1100"/>
-          </a:p>
-        </p:txBody>
-      </p:sp>
-      <p:sp>
-        <p:nvSpPr>
           <p:cNvPr id="203" name="Google Shape;203;p30"/>
           <p:cNvSpPr txBox="1">
             <a:spLocks noGrp="1"/>
@@ -7598,192 +10127,22 @@
           </a:p>
         </p:txBody>
       </p:sp>
-      <p:sp>
-        <p:nvSpPr>
-          <p:cNvPr id="204" name="Google Shape;204;p30"/>
-          <p:cNvSpPr txBox="1">
-            <a:spLocks noGrp="1"/>
-          </p:cNvSpPr>
-          <p:nvPr>
-            <p:ph type="body" idx="1"/>
-          </p:nvPr>
-        </p:nvSpPr>
-        <p:spPr>
-          <a:xfrm>
-            <a:off x="513038" y="3105150"/>
-            <a:ext cx="1831500" cy="1600200"/>
-          </a:xfrm>
-          <a:prstGeom prst="rect">
-            <a:avLst/>
-          </a:prstGeom>
-        </p:spPr>
-        <p:txBody>
-          <a:bodyPr spcFirstLastPara="1" wrap="square" lIns="91425" tIns="91425" rIns="91425" bIns="91425" anchor="t" anchorCtr="0">
-            <a:noAutofit/>
-          </a:bodyPr>
-          <a:lstStyle/>
-          <a:p>
-            <a:pPr marL="0" lvl="0" indent="0" algn="l" rtl="0">
-              <a:spcBef>
-                <a:spcPts val="600"/>
-              </a:spcBef>
-              <a:spcAft>
-                <a:spcPts val="0"/>
-              </a:spcAft>
-              <a:buNone/>
-            </a:pPr>
-            <a:r>
-              <a:rPr lang="en-US" sz="1100" b="1" dirty="0" smtClean="0"/>
-              <a:t>4: Visualize</a:t>
-            </a:r>
-            <a:endParaRPr sz="1100" b="1"/>
-          </a:p>
-          <a:p>
-            <a:pPr marL="0" lvl="0" indent="0" algn="l" rtl="0">
-              <a:spcBef>
-                <a:spcPts val="600"/>
-              </a:spcBef>
-              <a:spcAft>
-                <a:spcPts val="0"/>
-              </a:spcAft>
-              <a:buNone/>
-            </a:pPr>
-            <a:r>
-              <a:rPr lang="en" sz="1100" dirty="0" smtClean="0"/>
-              <a:t>Create graphs to get an idea of whether we’re proving or disproving our hypothesis.</a:t>
-            </a:r>
-            <a:endParaRPr sz="1100"/>
-          </a:p>
-        </p:txBody>
-      </p:sp>
-      <p:sp>
-        <p:nvSpPr>
-          <p:cNvPr id="205" name="Google Shape;205;p30"/>
-          <p:cNvSpPr txBox="1">
-            <a:spLocks noGrp="1"/>
-          </p:cNvSpPr>
-          <p:nvPr>
-            <p:ph type="body" idx="2"/>
-          </p:nvPr>
-        </p:nvSpPr>
-        <p:spPr>
-          <a:xfrm>
-            <a:off x="2438400" y="3105150"/>
-            <a:ext cx="1831500" cy="1600200"/>
-          </a:xfrm>
-          <a:prstGeom prst="rect">
-            <a:avLst/>
-          </a:prstGeom>
-        </p:spPr>
-        <p:txBody>
-          <a:bodyPr spcFirstLastPara="1" wrap="square" lIns="91425" tIns="91425" rIns="91425" bIns="91425" anchor="t" anchorCtr="0">
-            <a:noAutofit/>
-          </a:bodyPr>
-          <a:lstStyle/>
-          <a:p>
-            <a:pPr marL="0" lvl="0" indent="0" algn="l" rtl="0">
-              <a:spcBef>
-                <a:spcPts val="600"/>
-              </a:spcBef>
-              <a:spcAft>
-                <a:spcPts val="0"/>
-              </a:spcAft>
-              <a:buNone/>
-            </a:pPr>
-            <a:r>
-              <a:rPr lang="en-US" sz="1100" b="1" dirty="0" smtClean="0"/>
-              <a:t>5: Test</a:t>
-            </a:r>
-            <a:endParaRPr sz="1100" b="1"/>
-          </a:p>
-          <a:p>
-            <a:pPr marL="0" lvl="0" indent="0" algn="l" rtl="0">
-              <a:spcBef>
-                <a:spcPts val="600"/>
-              </a:spcBef>
-              <a:spcAft>
-                <a:spcPts val="0"/>
-              </a:spcAft>
-              <a:buNone/>
-            </a:pPr>
-            <a:r>
-              <a:rPr lang="en" sz="1100" dirty="0" smtClean="0"/>
-              <a:t>Run one or more tests to prove or disprove our hypothesis.</a:t>
-            </a:r>
-            <a:endParaRPr sz="1100"/>
-          </a:p>
-        </p:txBody>
-      </p:sp>
-      <p:sp>
-        <p:nvSpPr>
-          <p:cNvPr id="206" name="Google Shape;206;p30"/>
-          <p:cNvSpPr txBox="1">
-            <a:spLocks noGrp="1"/>
-          </p:cNvSpPr>
-          <p:nvPr>
-            <p:ph type="body" idx="3"/>
-          </p:nvPr>
-        </p:nvSpPr>
-        <p:spPr>
-          <a:xfrm>
-            <a:off x="4363763" y="3105150"/>
-            <a:ext cx="1831500" cy="1600200"/>
-          </a:xfrm>
-          <a:prstGeom prst="rect">
-            <a:avLst/>
-          </a:prstGeom>
-        </p:spPr>
-        <p:txBody>
-          <a:bodyPr spcFirstLastPara="1" wrap="square" lIns="91425" tIns="91425" rIns="91425" bIns="91425" anchor="t" anchorCtr="0">
-            <a:noAutofit/>
-          </a:bodyPr>
-          <a:lstStyle/>
-          <a:p>
-            <a:pPr marL="0" lvl="0" indent="0" algn="l" rtl="0">
-              <a:spcBef>
-                <a:spcPts val="600"/>
-              </a:spcBef>
-              <a:spcAft>
-                <a:spcPts val="0"/>
-              </a:spcAft>
-              <a:buNone/>
-            </a:pPr>
-            <a:r>
-              <a:rPr lang="en-US" sz="1100" b="1" dirty="0" smtClean="0"/>
-              <a:t>6: Conclusion</a:t>
-            </a:r>
-            <a:endParaRPr sz="1100" b="1"/>
-          </a:p>
-          <a:p>
-            <a:pPr marL="0" lvl="0" indent="0" algn="l" rtl="0">
-              <a:spcBef>
-                <a:spcPts val="600"/>
-              </a:spcBef>
-              <a:spcAft>
-                <a:spcPts val="0"/>
-              </a:spcAft>
-              <a:buNone/>
-            </a:pPr>
-            <a:r>
-              <a:rPr lang="en-US" sz="1100" dirty="0" smtClean="0"/>
-              <a:t>Interpret the results of our tests, use those results to answer our original question.</a:t>
-            </a:r>
-            <a:endParaRPr sz="1100"/>
-          </a:p>
-          <a:p>
-            <a:pPr marL="0" lvl="0" indent="0" algn="l" rtl="0">
-              <a:spcBef>
-                <a:spcPts val="600"/>
-              </a:spcBef>
-              <a:spcAft>
-                <a:spcPts val="0"/>
-              </a:spcAft>
-              <a:buNone/>
-            </a:pPr>
-            <a:endParaRPr sz="1100"/>
-          </a:p>
-        </p:txBody>
-      </p:sp>
+      <p:graphicFrame>
+        <p:nvGraphicFramePr>
+          <p:cNvPr id="10" name="Diagram 9"/>
+          <p:cNvGraphicFramePr/>
+          <p:nvPr/>
+        </p:nvGraphicFramePr>
+        <p:xfrm>
+          <a:off x="457200" y="1200150"/>
+          <a:ext cx="5181600" cy="3276600"/>
+        </p:xfrm>
+        <a:graphic>
+          <a:graphicData uri="http://schemas.openxmlformats.org/drawingml/2006/diagram">
+            <dgm:relIds xmlns:dgm="http://schemas.openxmlformats.org/drawingml/2006/diagram" xmlns:r="http://schemas.openxmlformats.org/officeDocument/2006/relationships" r:dm="rId3" r:lo="rId4" r:qs="rId5" r:cs="rId6"/>
+          </a:graphicData>
+        </a:graphic>
+      </p:graphicFrame>
     </p:spTree>
   </p:cSld>
   <p:clrMapOvr>
@@ -7862,11 +10221,7 @@
             </a:pPr>
             <a:r>
               <a:rPr lang="en-US" dirty="0" smtClean="0"/>
-              <a:t>Does discount amount have a statistically significant effect on the quantity of a product in an order? If so, at what level(s) of discount</a:t>
-            </a:r>
-            <a:r>
-              <a:rPr lang="en-US" dirty="0" smtClean="0"/>
-              <a:t>?</a:t>
+              <a:t>Does discount amount have a statistically significant effect on the quantity of a product in an order? If so, at what level(s) of discount?</a:t>
             </a:r>
           </a:p>
         </p:txBody>
@@ -7959,19 +10314,7 @@
             </a:pPr>
             <a:r>
               <a:rPr lang="en-US" dirty="0" smtClean="0"/>
-              <a:t>Do employees have a statistically significant effect on order values? </a:t>
-            </a:r>
-            <a:r>
-              <a:rPr lang="en-US" dirty="0" smtClean="0"/>
-              <a:t>If so, does </a:t>
-            </a:r>
-            <a:r>
-              <a:rPr lang="en-US" dirty="0" smtClean="0"/>
-              <a:t>the employee's region have a statistically significant effect</a:t>
-            </a:r>
-            <a:r>
-              <a:rPr lang="en-US" dirty="0" smtClean="0"/>
-              <a:t>?</a:t>
+              <a:t>Do employees have a statistically significant effect on order values? If so, does the employee's region have a statistically significant effect?</a:t>
             </a:r>
           </a:p>
         </p:txBody>
@@ -9173,6 +11516,54 @@
       </p:grpSpPr>
       <p:sp>
         <p:nvSpPr>
+          <p:cNvPr id="11" name="Rectangle 10"/>
+          <p:cNvSpPr/>
+          <p:nvPr/>
+        </p:nvSpPr>
+        <p:spPr>
+          <a:xfrm>
+            <a:off x="1295400" y="971550"/>
+            <a:ext cx="5410200" cy="3124200"/>
+          </a:xfrm>
+          <a:prstGeom prst="rect">
+            <a:avLst/>
+          </a:prstGeom>
+          <a:solidFill>
+            <a:schemeClr val="bg1"/>
+          </a:solidFill>
+          <a:ln>
+            <a:solidFill>
+              <a:schemeClr val="bg1"/>
+            </a:solidFill>
+          </a:ln>
+        </p:spPr>
+        <p:style>
+          <a:lnRef idx="2">
+            <a:schemeClr val="accent1">
+              <a:shade val="50000"/>
+            </a:schemeClr>
+          </a:lnRef>
+          <a:fillRef idx="1">
+            <a:schemeClr val="accent1"/>
+          </a:fillRef>
+          <a:effectRef idx="0">
+            <a:schemeClr val="accent1"/>
+          </a:effectRef>
+          <a:fontRef idx="minor">
+            <a:schemeClr val="lt1"/>
+          </a:fontRef>
+        </p:style>
+        <p:txBody>
+          <a:bodyPr rtlCol="0" anchor="ctr"/>
+          <a:lstStyle/>
+          <a:p>
+            <a:pPr algn="ctr"/>
+            <a:endParaRPr lang="en-US"/>
+          </a:p>
+        </p:txBody>
+      </p:sp>
+      <p:sp>
+        <p:nvSpPr>
           <p:cNvPr id="365" name="Google Shape;365;p40"/>
           <p:cNvSpPr txBox="1">
             <a:spLocks noGrp="1"/>
@@ -9240,15 +11631,20 @@
         </p:nvSpPr>
         <p:spPr>
           <a:xfrm>
-            <a:off x="1143000" y="3867150"/>
-            <a:ext cx="8001000" cy="1159800"/>
+            <a:off x="990600" y="133350"/>
+            <a:ext cx="6172200" cy="523220"/>
           </a:xfrm>
           <a:prstGeom prst="rect">
             <a:avLst/>
           </a:prstGeom>
+          <a:solidFill>
+            <a:schemeClr val="bg1"/>
+          </a:solidFill>
         </p:spPr>
         <p:txBody>
-          <a:bodyPr/>
+          <a:bodyPr wrap="square">
+            <a:spAutoFit/>
+          </a:bodyPr>
           <a:lstStyle/>
           <a:p>
             <a:pPr marL="0" marR="0" lvl="0" indent="0" algn="l" defTabSz="914400" rtl="0" eaLnBrk="1" fontAlgn="auto" latinLnBrk="0" hangingPunct="1">
@@ -9271,7 +11667,7 @@
               <a:defRPr/>
             </a:pPr>
             <a:r>
-              <a:rPr kumimoji="0" lang="en-US" sz="3200" b="1" i="0" u="none" strike="noStrike" kern="0" cap="none" spc="0" normalizeH="0" baseline="0" noProof="0" dirty="0" smtClean="0">
+              <a:rPr kumimoji="0" lang="en-US" sz="2800" b="1" i="0" u="none" strike="noStrike" kern="0" cap="none" spc="0" normalizeH="0" baseline="0" noProof="0" dirty="0" smtClean="0">
                 <a:ln>
                   <a:noFill/>
                 </a:ln>
@@ -9288,7 +11684,7 @@
               </a:rPr>
               <a:t>Conclusion and Recommendations</a:t>
             </a:r>
-            <a:endParaRPr kumimoji="0" lang="en-US" sz="3200" b="1" i="0" u="none" strike="noStrike" kern="0" cap="none" spc="0" normalizeH="0" baseline="0" noProof="0" dirty="0">
+            <a:endParaRPr kumimoji="0" lang="en-US" sz="2800" b="1" i="0" u="none" strike="noStrike" kern="0" cap="none" spc="0" normalizeH="0" baseline="0" noProof="0" dirty="0">
               <a:ln>
                 <a:noFill/>
               </a:ln>
@@ -9316,8 +11712,8 @@
         </p:nvSpPr>
         <p:spPr>
           <a:xfrm>
-            <a:off x="1295400" y="590550"/>
-            <a:ext cx="2675100" cy="1752600"/>
+            <a:off x="1295400" y="819150"/>
+            <a:ext cx="2675100" cy="1828800"/>
           </a:xfrm>
           <a:prstGeom prst="rect">
             <a:avLst/>
@@ -9354,7 +11750,7 @@
                   <a:noFill/>
                 </a:ln>
                 <a:solidFill>
-                  <a:schemeClr val="bg1"/>
+                  <a:schemeClr val="tx1"/>
                 </a:solidFill>
                 <a:effectLst/>
                 <a:uLnTx/>
@@ -9381,8 +11777,8 @@
                 <a:srgbClr val="000000"/>
               </a:buClr>
               <a:buSzTx/>
-              <a:buFont typeface="Arial"/>
-              <a:buNone/>
+              <a:buFont typeface="Arial" pitchFamily="34" charset="0"/>
+              <a:buChar char="•"/>
               <a:tabLst/>
               <a:defRPr/>
             </a:pPr>
@@ -9392,7 +11788,7 @@
                   <a:noFill/>
                 </a:ln>
                 <a:solidFill>
-                  <a:schemeClr val="bg1"/>
+                  <a:schemeClr val="tx1"/>
                 </a:solidFill>
                 <a:effectLst/>
                 <a:uLnTx/>
@@ -9401,7 +11797,76 @@
                 <a:cs typeface="Lato Light" pitchFamily="34" charset="0"/>
                 <a:sym typeface="Arial"/>
               </a:rPr>
-              <a:t>5%, 15%, and 25% discounts provide the highest increase in quantity sold. 5% provides</a:t>
+              <a:t>5%, 15%, and 25% discounts provide the highest increase in quantity sold. </a:t>
+            </a:r>
+            <a:endParaRPr kumimoji="0" lang="en-US" b="0" i="0" u="none" strike="noStrike" kern="0" cap="none" spc="0" normalizeH="0" baseline="0" noProof="0" dirty="0" smtClean="0">
+              <a:ln>
+                <a:noFill/>
+              </a:ln>
+              <a:solidFill>
+                <a:schemeClr val="tx1"/>
+              </a:solidFill>
+              <a:effectLst/>
+              <a:uLnTx/>
+              <a:uFillTx/>
+              <a:latin typeface="Lato Light" pitchFamily="34" charset="0"/>
+              <a:cs typeface="Lato Light" pitchFamily="34" charset="0"/>
+              <a:sym typeface="Arial"/>
+            </a:endParaRPr>
+          </a:p>
+          <a:p>
+            <a:pPr marL="0" marR="0" lvl="0" indent="0" algn="l" defTabSz="914400" rtl="0" eaLnBrk="1" fontAlgn="auto" latinLnBrk="0" hangingPunct="1">
+              <a:lnSpc>
+                <a:spcPct val="100000"/>
+              </a:lnSpc>
+              <a:spcBef>
+                <a:spcPts val="0"/>
+              </a:spcBef>
+              <a:spcAft>
+                <a:spcPts val="0"/>
+              </a:spcAft>
+              <a:buClr>
+                <a:srgbClr val="000000"/>
+              </a:buClr>
+              <a:buSzTx/>
+              <a:buFont typeface="Arial" pitchFamily="34" charset="0"/>
+              <a:buChar char="•"/>
+              <a:tabLst/>
+              <a:defRPr/>
+            </a:pPr>
+            <a:r>
+              <a:rPr kumimoji="0" lang="en-US" b="0" i="0" u="none" strike="noStrike" kern="0" cap="none" spc="0" normalizeH="0" baseline="0" noProof="0" dirty="0" smtClean="0">
+                <a:ln>
+                  <a:noFill/>
+                </a:ln>
+                <a:solidFill>
+                  <a:schemeClr val="tx1"/>
+                </a:solidFill>
+                <a:effectLst/>
+                <a:uLnTx/>
+                <a:uFillTx/>
+                <a:latin typeface="Lato Light" pitchFamily="34" charset="0"/>
+                <a:cs typeface="Lato Light" pitchFamily="34" charset="0"/>
+                <a:sym typeface="Arial"/>
+              </a:rPr>
+              <a:t>5</a:t>
+            </a:r>
+            <a:r>
+              <a:rPr kumimoji="0" lang="en-US" b="0" i="0" u="none" strike="noStrike" kern="0" cap="none" spc="0" normalizeH="0" baseline="0" noProof="0" dirty="0" smtClean="0">
+                <a:ln>
+                  <a:noFill/>
+                </a:ln>
+                <a:solidFill>
+                  <a:schemeClr val="tx1"/>
+                </a:solidFill>
+                <a:effectLst/>
+                <a:uLnTx/>
+                <a:uFillTx/>
+                <a:latin typeface="Lato Light" pitchFamily="34" charset="0"/>
+                <a:cs typeface="Lato Light" pitchFamily="34" charset="0"/>
+                <a:sym typeface="Arial"/>
+              </a:rPr>
+              <a:t>% provides</a:t>
             </a:r>
             <a:r>
               <a:rPr kumimoji="0" lang="en-US" b="0" i="0" u="none" strike="noStrike" kern="0" cap="none" spc="0" normalizeH="0" noProof="0" dirty="0" smtClean="0">
@@ -9409,7 +11874,7 @@
                   <a:noFill/>
                 </a:ln>
                 <a:solidFill>
-                  <a:schemeClr val="bg1"/>
+                  <a:schemeClr val="tx1"/>
                 </a:solidFill>
                 <a:effectLst/>
                 <a:uLnTx/>
@@ -9423,7 +11888,7 @@
             <a:r>
               <a:rPr lang="en-US" dirty="0" smtClean="0">
                 <a:solidFill>
-                  <a:schemeClr val="bg1"/>
+                  <a:schemeClr val="tx1"/>
                 </a:solidFill>
                 <a:latin typeface="Lato Light" pitchFamily="34" charset="0"/>
                 <a:cs typeface="Lato Light" pitchFamily="34" charset="0"/>
@@ -9433,7 +11898,7 @@
             <a:r>
               <a:rPr lang="en-US" dirty="0" err="1" smtClean="0">
                 <a:solidFill>
-                  <a:schemeClr val="bg1"/>
+                  <a:schemeClr val="tx1"/>
                 </a:solidFill>
                 <a:latin typeface="Lato Light" pitchFamily="34" charset="0"/>
                 <a:cs typeface="Lato Light" pitchFamily="34" charset="0"/>
@@ -9443,7 +11908,7 @@
             <a:r>
               <a:rPr lang="en-US" dirty="0" smtClean="0">
                 <a:solidFill>
-                  <a:schemeClr val="bg1"/>
+                  <a:schemeClr val="tx1"/>
                 </a:solidFill>
                 <a:latin typeface="Lato Light" pitchFamily="34" charset="0"/>
                 <a:cs typeface="Lato Light" pitchFamily="34" charset="0"/>
@@ -9455,7 +11920,7 @@
                 <a:noFill/>
               </a:ln>
               <a:solidFill>
-                <a:schemeClr val="bg1"/>
+                <a:schemeClr val="tx1"/>
               </a:solidFill>
               <a:effectLst/>
               <a:uLnTx/>
@@ -9477,7 +11942,7 @@
         </p:nvSpPr>
         <p:spPr>
           <a:xfrm>
-            <a:off x="4114800" y="590550"/>
+            <a:off x="4114800" y="819150"/>
             <a:ext cx="2675100" cy="1981200"/>
           </a:xfrm>
           <a:prstGeom prst="rect">
@@ -9515,7 +11980,7 @@
                   <a:noFill/>
                 </a:ln>
                 <a:solidFill>
-                  <a:schemeClr val="bg1"/>
+                  <a:schemeClr val="tx1"/>
                 </a:solidFill>
                 <a:effectLst/>
                 <a:uLnTx/>
@@ -9542,8 +12007,8 @@
                 <a:srgbClr val="000000"/>
               </a:buClr>
               <a:buSzTx/>
-              <a:buFont typeface="Arial"/>
-              <a:buNone/>
+              <a:buFont typeface="Arial" pitchFamily="34" charset="0"/>
+              <a:buChar char="•"/>
               <a:tabLst/>
               <a:defRPr/>
             </a:pPr>
@@ -9553,7 +12018,7 @@
                   <a:noFill/>
                 </a:ln>
                 <a:solidFill>
-                  <a:schemeClr val="bg1"/>
+                  <a:schemeClr val="tx1"/>
                 </a:solidFill>
                 <a:effectLst/>
                 <a:uLnTx/>
@@ -9562,7 +12027,110 @@
                 <a:cs typeface="Lato Light" pitchFamily="34" charset="0"/>
                 <a:sym typeface="Arial"/>
               </a:rPr>
-              <a:t>European Sales Reps have both the best and worst average order values. North American Sales Reps are the most consistent, but could still learn from the top</a:t>
+              <a:t>European Sales Reps have both the best and worst average order values. </a:t>
+            </a:r>
+            <a:endParaRPr kumimoji="0" lang="en-US" b="0" i="0" u="none" strike="noStrike" kern="0" cap="none" spc="0" normalizeH="0" baseline="0" noProof="0" dirty="0" smtClean="0">
+              <a:ln>
+                <a:noFill/>
+              </a:ln>
+              <a:solidFill>
+                <a:schemeClr val="tx1"/>
+              </a:solidFill>
+              <a:effectLst/>
+              <a:uLnTx/>
+              <a:uFillTx/>
+              <a:latin typeface="Lato Light" pitchFamily="34" charset="0"/>
+              <a:cs typeface="Lato Light" pitchFamily="34" charset="0"/>
+              <a:sym typeface="Arial"/>
+            </a:endParaRPr>
+          </a:p>
+          <a:p>
+            <a:pPr marL="0" marR="0" lvl="0" indent="0" algn="l" defTabSz="914400" rtl="0" eaLnBrk="1" fontAlgn="auto" latinLnBrk="0" hangingPunct="1">
+              <a:lnSpc>
+                <a:spcPct val="100000"/>
+              </a:lnSpc>
+              <a:spcBef>
+                <a:spcPts val="0"/>
+              </a:spcBef>
+              <a:spcAft>
+                <a:spcPts val="0"/>
+              </a:spcAft>
+              <a:buClr>
+                <a:srgbClr val="000000"/>
+              </a:buClr>
+              <a:buSzTx/>
+              <a:buFont typeface="Arial" pitchFamily="34" charset="0"/>
+              <a:buChar char="•"/>
+              <a:tabLst/>
+              <a:defRPr/>
+            </a:pPr>
+            <a:r>
+              <a:rPr kumimoji="0" lang="en-US" b="0" i="0" u="none" strike="noStrike" kern="0" cap="none" spc="0" normalizeH="0" baseline="0" noProof="0" dirty="0" smtClean="0">
+                <a:ln>
+                  <a:noFill/>
+                </a:ln>
+                <a:solidFill>
+                  <a:schemeClr val="tx1"/>
+                </a:solidFill>
+                <a:effectLst/>
+                <a:uLnTx/>
+                <a:uFillTx/>
+                <a:latin typeface="Lato Light" pitchFamily="34" charset="0"/>
+                <a:cs typeface="Lato Light" pitchFamily="34" charset="0"/>
+                <a:sym typeface="Arial"/>
+              </a:rPr>
+              <a:t>American </a:t>
+            </a:r>
+            <a:r>
+              <a:rPr kumimoji="0" lang="en-US" b="0" i="0" u="none" strike="noStrike" kern="0" cap="none" spc="0" normalizeH="0" baseline="0" noProof="0" dirty="0" smtClean="0">
+                <a:ln>
+                  <a:noFill/>
+                </a:ln>
+                <a:solidFill>
+                  <a:schemeClr val="tx1"/>
+                </a:solidFill>
+                <a:effectLst/>
+                <a:uLnTx/>
+                <a:uFillTx/>
+                <a:latin typeface="Lato Light" pitchFamily="34" charset="0"/>
+                <a:cs typeface="Lato Light" pitchFamily="34" charset="0"/>
+                <a:sym typeface="Arial"/>
+              </a:rPr>
+              <a:t>Sales Reps are the most consistent, </a:t>
+            </a:r>
+            <a:r>
+              <a:rPr kumimoji="0" lang="en-US" b="0" i="0" u="none" strike="noStrike" kern="0" cap="none" spc="0" normalizeH="0" baseline="0" noProof="0" dirty="0" smtClean="0">
+                <a:ln>
+                  <a:noFill/>
+                </a:ln>
+                <a:solidFill>
+                  <a:schemeClr val="tx1"/>
+                </a:solidFill>
+                <a:effectLst/>
+                <a:uLnTx/>
+                <a:uFillTx/>
+                <a:latin typeface="Lato Light" pitchFamily="34" charset="0"/>
+                <a:cs typeface="Lato Light" pitchFamily="34" charset="0"/>
+                <a:sym typeface="Arial"/>
+              </a:rPr>
+              <a:t>could </a:t>
+            </a:r>
+            <a:r>
+              <a:rPr kumimoji="0" lang="en-US" b="0" i="0" u="none" strike="noStrike" kern="0" cap="none" spc="0" normalizeH="0" baseline="0" noProof="0" dirty="0" smtClean="0">
+                <a:ln>
+                  <a:noFill/>
+                </a:ln>
+                <a:solidFill>
+                  <a:schemeClr val="tx1"/>
+                </a:solidFill>
+                <a:effectLst/>
+                <a:uLnTx/>
+                <a:uFillTx/>
+                <a:latin typeface="Lato Light" pitchFamily="34" charset="0"/>
+                <a:cs typeface="Lato Light" pitchFamily="34" charset="0"/>
+                <a:sym typeface="Arial"/>
+              </a:rPr>
+              <a:t>still learn from the top</a:t>
             </a:r>
             <a:r>
               <a:rPr kumimoji="0" lang="en-US" b="0" i="0" u="none" strike="noStrike" kern="0" cap="none" spc="0" normalizeH="0" noProof="0" dirty="0" smtClean="0">
@@ -9570,7 +12138,7 @@
                   <a:noFill/>
                 </a:ln>
                 <a:solidFill>
-                  <a:schemeClr val="bg1"/>
+                  <a:schemeClr val="tx1"/>
                 </a:solidFill>
                 <a:effectLst/>
                 <a:uLnTx/>
@@ -9586,7 +12154,7 @@
                 <a:noFill/>
               </a:ln>
               <a:solidFill>
-                <a:schemeClr val="bg1"/>
+                <a:schemeClr val="tx1"/>
               </a:solidFill>
               <a:effectLst/>
               <a:uLnTx/>
@@ -9608,8 +12176,8 @@
         </p:nvSpPr>
         <p:spPr>
           <a:xfrm>
-            <a:off x="1295400" y="2190750"/>
-            <a:ext cx="2675100" cy="1752600"/>
+            <a:off x="1295400" y="2647951"/>
+            <a:ext cx="2675100" cy="1384995"/>
           </a:xfrm>
           <a:prstGeom prst="rect">
             <a:avLst/>
@@ -9620,37 +12188,37 @@
           </a:ln>
         </p:spPr>
         <p:txBody>
-          <a:bodyPr spcFirstLastPara="1" wrap="square" lIns="91425" tIns="91425" rIns="91425" bIns="91425" anchor="t" anchorCtr="0">
-            <a:noAutofit/>
+          <a:bodyPr spcFirstLastPara="1" wrap="square" lIns="91425" tIns="45720" rIns="91425" bIns="45720" anchor="t" anchorCtr="0">
+            <a:spAutoFit/>
           </a:bodyPr>
           <a:lstStyle/>
           <a:p>
-            <a:pPr marL="0" marR="0" lvl="0" indent="0" algn="l" defTabSz="914400" rtl="0" eaLnBrk="1" fontAlgn="auto" latinLnBrk="0" hangingPunct="1">
-              <a:lnSpc>
-                <a:spcPct val="100000"/>
-              </a:lnSpc>
-              <a:spcBef>
-                <a:spcPts val="600"/>
-              </a:spcBef>
-              <a:spcAft>
-                <a:spcPts val="0"/>
-              </a:spcAft>
+            <a:pPr lvl="0">
               <a:buClr>
                 <a:schemeClr val="lt2"/>
               </a:buClr>
               <a:buSzPts val="1600"/>
-              <a:buFont typeface="Lato Light"/>
-              <a:buNone/>
-              <a:tabLst/>
               <a:defRPr/>
             </a:pPr>
             <a:r>
-              <a:rPr kumimoji="0" lang="en-US" b="1" i="0" u="none" strike="noStrike" kern="0" cap="none" spc="0" normalizeH="0" baseline="0" noProof="0" dirty="0" smtClean="0">
+              <a:rPr lang="en-US" b="1" dirty="0" smtClean="0">
+                <a:solidFill>
+                  <a:schemeClr val="tx1"/>
+                </a:solidFill>
+                <a:latin typeface="Lato Light"/>
+                <a:ea typeface="Lato Light"/>
+                <a:cs typeface="Lato Light"/>
+                <a:sym typeface="Lato Light"/>
+              </a:rPr>
+              <a:t>Q</a:t>
+            </a:r>
+            <a:r>
+              <a:rPr kumimoji="0" lang="en-US" b="1" i="0" u="none" strike="noStrike" kern="0" cap="none" spc="0" normalizeH="0" baseline="0" noProof="0" dirty="0" err="1" smtClean="0">
                 <a:ln>
                   <a:noFill/>
                 </a:ln>
                 <a:solidFill>
-                  <a:schemeClr val="bg1"/>
+                  <a:schemeClr val="tx1"/>
                 </a:solidFill>
                 <a:effectLst/>
                 <a:uLnTx/>
@@ -9660,37 +12228,119 @@
                 <a:cs typeface="Lato Light"/>
                 <a:sym typeface="Lato Light"/>
               </a:rPr>
-              <a:t>Question 3</a:t>
+              <a:t>uestion</a:t>
             </a:r>
+            <a:r>
+              <a:rPr kumimoji="0" lang="en-US" b="1" i="0" u="none" strike="noStrike" kern="0" cap="none" spc="0" normalizeH="0" baseline="0" noProof="0" dirty="0" smtClean="0">
+                <a:ln>
+                  <a:noFill/>
+                </a:ln>
+                <a:solidFill>
+                  <a:schemeClr val="tx1"/>
+                </a:solidFill>
+                <a:effectLst/>
+                <a:uLnTx/>
+                <a:uFillTx/>
+                <a:latin typeface="Lato Light"/>
+                <a:ea typeface="Lato Light"/>
+                <a:cs typeface="Lato Light"/>
+                <a:sym typeface="Lato Light"/>
+              </a:rPr>
+              <a:t> 3</a:t>
+            </a:r>
+            <a:endParaRPr kumimoji="0" lang="en-US" b="1" i="0" u="none" strike="noStrike" kern="0" cap="none" spc="0" normalizeH="0" baseline="0" noProof="0" dirty="0" smtClean="0">
+              <a:ln>
+                <a:noFill/>
+              </a:ln>
+              <a:solidFill>
+                <a:schemeClr val="tx1"/>
+              </a:solidFill>
+              <a:effectLst/>
+              <a:uLnTx/>
+              <a:uFillTx/>
+              <a:latin typeface="Lato Light"/>
+              <a:ea typeface="Lato Light"/>
+              <a:cs typeface="Lato Light"/>
+              <a:sym typeface="Lato Light"/>
+            </a:endParaRPr>
           </a:p>
           <a:p>
             <a:pPr lvl="0">
-              <a:spcBef>
-                <a:spcPts val="600"/>
-              </a:spcBef>
-              <a:buClr>
-                <a:schemeClr val="lt2"/>
-              </a:buClr>
-              <a:buSzPts val="1600"/>
+              <a:buFont typeface="Arial" pitchFamily="34" charset="0"/>
+              <a:buChar char="•"/>
+              <a:defRPr/>
             </a:pPr>
             <a:r>
               <a:rPr lang="en-US" dirty="0" smtClean="0">
                 <a:solidFill>
-                  <a:schemeClr val="bg1"/>
+                  <a:schemeClr val="tx1"/>
                 </a:solidFill>
                 <a:latin typeface="Lato Light"/>
                 <a:ea typeface="Lato Light"/>
                 <a:cs typeface="Lato Light"/>
                 <a:sym typeface="Lato Light"/>
               </a:rPr>
-              <a:t>European customers submit the most orders on average. Targeting new European customers should result in higher revenues.</a:t>
+              <a:t>European customers submit the most orders on </a:t>
+            </a:r>
+            <a:r>
+              <a:rPr lang="en-US" dirty="0" smtClean="0">
+                <a:solidFill>
+                  <a:schemeClr val="tx1"/>
+                </a:solidFill>
+                <a:latin typeface="Lato Light"/>
+                <a:ea typeface="Lato Light"/>
+                <a:cs typeface="Lato Light"/>
+                <a:sym typeface="Lato Light"/>
+              </a:rPr>
+              <a:t>average</a:t>
+            </a:r>
+            <a:r>
+              <a:rPr lang="en-US" dirty="0" smtClean="0">
+                <a:solidFill>
+                  <a:schemeClr val="tx1"/>
+                </a:solidFill>
+                <a:latin typeface="Lato Light" pitchFamily="34" charset="0"/>
+                <a:cs typeface="Lato Light" pitchFamily="34" charset="0"/>
+              </a:rPr>
+              <a:t> . </a:t>
+            </a:r>
+          </a:p>
+          <a:p>
+            <a:pPr lvl="0">
+              <a:buFont typeface="Arial" pitchFamily="34" charset="0"/>
+              <a:buChar char="•"/>
+              <a:defRPr/>
+            </a:pPr>
+            <a:r>
+              <a:rPr lang="en-US" dirty="0" smtClean="0">
+                <a:solidFill>
+                  <a:schemeClr val="tx1"/>
+                </a:solidFill>
+                <a:latin typeface="Lato Light"/>
+                <a:ea typeface="Lato Light"/>
+                <a:cs typeface="Lato Light"/>
+                <a:sym typeface="Lato Light"/>
+              </a:rPr>
+              <a:t>Targeting </a:t>
+            </a:r>
+            <a:r>
+              <a:rPr lang="en-US" dirty="0" smtClean="0">
+                <a:solidFill>
+                  <a:schemeClr val="tx1"/>
+                </a:solidFill>
+                <a:latin typeface="Lato Light"/>
+                <a:ea typeface="Lato Light"/>
+                <a:cs typeface="Lato Light"/>
+                <a:sym typeface="Lato Light"/>
+              </a:rPr>
+              <a:t>new European customers should result in higher revenues.</a:t>
             </a:r>
             <a:endParaRPr kumimoji="0" lang="en-US" i="0" u="none" strike="noStrike" kern="0" cap="none" spc="0" normalizeH="0" baseline="0" noProof="0" dirty="0" smtClean="0">
               <a:ln>
                 <a:noFill/>
               </a:ln>
               <a:solidFill>
-                <a:schemeClr val="bg1"/>
+                <a:schemeClr val="tx1"/>
               </a:solidFill>
               <a:effectLst/>
               <a:uLnTx/>
@@ -9711,8 +12361,8 @@
         </p:nvSpPr>
         <p:spPr>
           <a:xfrm>
-            <a:off x="4114800" y="2495549"/>
-            <a:ext cx="2667000" cy="1461939"/>
+            <a:off x="4114800" y="2647950"/>
+            <a:ext cx="2667000" cy="1384995"/>
           </a:xfrm>
           <a:prstGeom prst="rect">
             <a:avLst/>
@@ -9725,9 +12375,6 @@
           <a:lstStyle/>
           <a:p>
             <a:pPr lvl="0">
-              <a:spcBef>
-                <a:spcPts val="600"/>
-              </a:spcBef>
               <a:buClr>
                 <a:srgbClr val="B7B7B7"/>
               </a:buClr>
@@ -9736,7 +12383,7 @@
             <a:r>
               <a:rPr lang="en-US" b="1" dirty="0" smtClean="0">
                 <a:solidFill>
-                  <a:schemeClr val="bg1"/>
+                  <a:schemeClr val="tx1"/>
                 </a:solidFill>
                 <a:latin typeface="Lato Light"/>
                 <a:cs typeface="Lato Light"/>
@@ -9747,28 +12394,74 @@
           </a:p>
           <a:p>
             <a:pPr lvl="0">
-              <a:spcBef>
-                <a:spcPts val="600"/>
-              </a:spcBef>
-              <a:buClr>
-                <a:srgbClr val="B7B7B7"/>
-              </a:buClr>
-              <a:buSzPts val="1600"/>
+              <a:buFont typeface="Arial" pitchFamily="34" charset="0"/>
+              <a:buChar char="•"/>
+              <a:defRPr/>
             </a:pPr>
             <a:r>
               <a:rPr lang="en-US" dirty="0" smtClean="0">
                 <a:solidFill>
-                  <a:schemeClr val="bg1"/>
+                  <a:schemeClr val="tx1"/>
                 </a:solidFill>
                 <a:latin typeface="Lato Light"/>
                 <a:cs typeface="Lato Light"/>
                 <a:sym typeface="Lato Light"/>
               </a:rPr>
-              <a:t>Discontinued Items had vastly higher average order values. Bringing as many back as possible should result in more revenue.</a:t>
+              <a:t>Discontinued Items had vastly higher average order </a:t>
+            </a:r>
+            <a:r>
+              <a:rPr lang="en-US" dirty="0" smtClean="0">
+                <a:solidFill>
+                  <a:schemeClr val="tx1"/>
+                </a:solidFill>
+                <a:latin typeface="Lato Light"/>
+                <a:cs typeface="Lato Light"/>
+                <a:sym typeface="Lato Light"/>
+              </a:rPr>
+              <a:t>values</a:t>
+            </a:r>
+            <a:r>
+              <a:rPr lang="en-US" dirty="0" smtClean="0">
+                <a:solidFill>
+                  <a:schemeClr val="tx1"/>
+                </a:solidFill>
+                <a:latin typeface="Lato Light" pitchFamily="34" charset="0"/>
+                <a:cs typeface="Lato Light" pitchFamily="34" charset="0"/>
+              </a:rPr>
+              <a:t> . </a:t>
+            </a:r>
+          </a:p>
+          <a:p>
+            <a:pPr lvl="0">
+              <a:buFont typeface="Arial" pitchFamily="34" charset="0"/>
+              <a:buChar char="•"/>
+              <a:defRPr/>
+            </a:pPr>
+            <a:r>
+              <a:rPr lang="en-US" dirty="0" smtClean="0">
+                <a:solidFill>
+                  <a:schemeClr val="tx1"/>
+                </a:solidFill>
+                <a:latin typeface="Lato Light"/>
+                <a:cs typeface="Lato Light"/>
+                <a:sym typeface="Lato Light"/>
+              </a:rPr>
+              <a:t>Bringing </a:t>
+            </a:r>
+            <a:r>
+              <a:rPr lang="en-US" dirty="0" smtClean="0">
+                <a:solidFill>
+                  <a:schemeClr val="tx1"/>
+                </a:solidFill>
+                <a:latin typeface="Lato Light"/>
+                <a:cs typeface="Lato Light"/>
+                <a:sym typeface="Lato Light"/>
+              </a:rPr>
+              <a:t>as many back as possible should result in more revenue.</a:t>
             </a:r>
             <a:endParaRPr lang="en-US" dirty="0">
               <a:solidFill>
-                <a:schemeClr val="bg1"/>
+                <a:schemeClr val="tx1"/>
               </a:solidFill>
               <a:latin typeface="Lato Light"/>
               <a:cs typeface="Lato Light"/>

</xml_diff>